<commit_message>
Make updates to formatting
</commit_message>
<xml_diff>
--- a/Robert_Bresley_final_project.pptx
+++ b/Robert_Bresley_final_project.pptx
@@ -2,7 +2,7 @@
 <file path=ppt/presentation.xml><?xml version="1.0" encoding="utf-8"?>
 <p:presentation xmlns:a="http://schemas.openxmlformats.org/drawingml/2006/main" xmlns:r="http://schemas.openxmlformats.org/officeDocument/2006/relationships" xmlns:p="http://schemas.openxmlformats.org/presentationml/2006/main" saveSubsetFonts="1">
   <p:sldMasterIdLst>
-    <p:sldMasterId id="2147483648" r:id="rId1"/>
+    <p:sldMasterId id="2147483660" r:id="rId1"/>
   </p:sldMasterIdLst>
   <p:sldIdLst>
     <p:sldId id="256" r:id="rId2"/>
@@ -32,7 +32,7 @@
     <a:defPPr>
       <a:defRPr lang="en-US"/>
     </a:defPPr>
-    <a:lvl1pPr marL="0" algn="l" defTabSz="914400" rtl="0" eaLnBrk="1" latinLnBrk="0" hangingPunct="1">
+    <a:lvl1pPr marL="0" algn="l" defTabSz="457200" rtl="0" eaLnBrk="1" latinLnBrk="0" hangingPunct="1">
       <a:defRPr sz="1800" kern="1200">
         <a:solidFill>
           <a:schemeClr val="tx1"/>
@@ -42,7 +42,7 @@
         <a:cs typeface="+mn-cs"/>
       </a:defRPr>
     </a:lvl1pPr>
-    <a:lvl2pPr marL="457200" algn="l" defTabSz="914400" rtl="0" eaLnBrk="1" latinLnBrk="0" hangingPunct="1">
+    <a:lvl2pPr marL="457200" algn="l" defTabSz="457200" rtl="0" eaLnBrk="1" latinLnBrk="0" hangingPunct="1">
       <a:defRPr sz="1800" kern="1200">
         <a:solidFill>
           <a:schemeClr val="tx1"/>
@@ -52,7 +52,7 @@
         <a:cs typeface="+mn-cs"/>
       </a:defRPr>
     </a:lvl2pPr>
-    <a:lvl3pPr marL="914400" algn="l" defTabSz="914400" rtl="0" eaLnBrk="1" latinLnBrk="0" hangingPunct="1">
+    <a:lvl3pPr marL="914400" algn="l" defTabSz="457200" rtl="0" eaLnBrk="1" latinLnBrk="0" hangingPunct="1">
       <a:defRPr sz="1800" kern="1200">
         <a:solidFill>
           <a:schemeClr val="tx1"/>
@@ -62,7 +62,7 @@
         <a:cs typeface="+mn-cs"/>
       </a:defRPr>
     </a:lvl3pPr>
-    <a:lvl4pPr marL="1371600" algn="l" defTabSz="914400" rtl="0" eaLnBrk="1" latinLnBrk="0" hangingPunct="1">
+    <a:lvl4pPr marL="1371600" algn="l" defTabSz="457200" rtl="0" eaLnBrk="1" latinLnBrk="0" hangingPunct="1">
       <a:defRPr sz="1800" kern="1200">
         <a:solidFill>
           <a:schemeClr val="tx1"/>
@@ -72,7 +72,7 @@
         <a:cs typeface="+mn-cs"/>
       </a:defRPr>
     </a:lvl4pPr>
-    <a:lvl5pPr marL="1828800" algn="l" defTabSz="914400" rtl="0" eaLnBrk="1" latinLnBrk="0" hangingPunct="1">
+    <a:lvl5pPr marL="1828800" algn="l" defTabSz="457200" rtl="0" eaLnBrk="1" latinLnBrk="0" hangingPunct="1">
       <a:defRPr sz="1800" kern="1200">
         <a:solidFill>
           <a:schemeClr val="tx1"/>
@@ -82,7 +82,7 @@
         <a:cs typeface="+mn-cs"/>
       </a:defRPr>
     </a:lvl5pPr>
-    <a:lvl6pPr marL="2286000" algn="l" defTabSz="914400" rtl="0" eaLnBrk="1" latinLnBrk="0" hangingPunct="1">
+    <a:lvl6pPr marL="2286000" algn="l" defTabSz="457200" rtl="0" eaLnBrk="1" latinLnBrk="0" hangingPunct="1">
       <a:defRPr sz="1800" kern="1200">
         <a:solidFill>
           <a:schemeClr val="tx1"/>
@@ -92,7 +92,7 @@
         <a:cs typeface="+mn-cs"/>
       </a:defRPr>
     </a:lvl6pPr>
-    <a:lvl7pPr marL="2743200" algn="l" defTabSz="914400" rtl="0" eaLnBrk="1" latinLnBrk="0" hangingPunct="1">
+    <a:lvl7pPr marL="2743200" algn="l" defTabSz="457200" rtl="0" eaLnBrk="1" latinLnBrk="0" hangingPunct="1">
       <a:defRPr sz="1800" kern="1200">
         <a:solidFill>
           <a:schemeClr val="tx1"/>
@@ -102,7 +102,7 @@
         <a:cs typeface="+mn-cs"/>
       </a:defRPr>
     </a:lvl7pPr>
-    <a:lvl8pPr marL="3200400" algn="l" defTabSz="914400" rtl="0" eaLnBrk="1" latinLnBrk="0" hangingPunct="1">
+    <a:lvl8pPr marL="3200400" algn="l" defTabSz="457200" rtl="0" eaLnBrk="1" latinLnBrk="0" hangingPunct="1">
       <a:defRPr sz="1800" kern="1200">
         <a:solidFill>
           <a:schemeClr val="tx1"/>
@@ -112,7 +112,7 @@
         <a:cs typeface="+mn-cs"/>
       </a:defRPr>
     </a:lvl8pPr>
-    <a:lvl9pPr marL="3657600" algn="l" defTabSz="914400" rtl="0" eaLnBrk="1" latinLnBrk="0" hangingPunct="1">
+    <a:lvl9pPr marL="3657600" algn="l" defTabSz="457200" rtl="0" eaLnBrk="1" latinLnBrk="0" hangingPunct="1">
       <a:defRPr sz="1800" kern="1200">
         <a:solidFill>
           <a:schemeClr val="tx1"/>
@@ -127,7 +127,7 @@
 </file>
 
 <file path=ppt/slideLayouts/slideLayout1.xml><?xml version="1.0" encoding="utf-8"?>
-<p:sldLayout xmlns:a="http://schemas.openxmlformats.org/drawingml/2006/main" xmlns:r="http://schemas.openxmlformats.org/officeDocument/2006/relationships" xmlns:p="http://schemas.openxmlformats.org/presentationml/2006/main" type="title" preserve="1">
+<p:sldLayout xmlns:a="http://schemas.openxmlformats.org/drawingml/2006/main" xmlns:r="http://schemas.openxmlformats.org/officeDocument/2006/relationships" xmlns:p="http://schemas.openxmlformats.org/presentationml/2006/main" showMasterSp="0" type="title" preserve="1">
   <p:cSld name="Title Slide">
     <p:spTree>
       <p:nvGrpSpPr>
@@ -145,31 +145,113 @@
       </p:grpSpPr>
       <p:sp>
         <p:nvSpPr>
-          <p:cNvPr id="2" name="Title 1">
-            <a:extLst>
-              <a:ext uri="{FF2B5EF4-FFF2-40B4-BE49-F238E27FC236}">
-                <a16:creationId xmlns:a16="http://schemas.microsoft.com/office/drawing/2014/main" id="{C8737826-4AD2-422C-AB17-CC4030E84D41}"/>
-              </a:ext>
-            </a:extLst>
-          </p:cNvPr>
-          <p:cNvSpPr>
-            <a:spLocks noGrp="1"/>
-          </p:cNvSpPr>
-          <p:nvPr>
-            <p:ph type="ctrTitle"/>
-          </p:nvPr>
+          <p:cNvPr id="7" name="Rectangle 6"/>
+          <p:cNvSpPr/>
+          <p:nvPr/>
         </p:nvSpPr>
         <p:spPr>
           <a:xfrm>
-            <a:off x="1524000" y="1122363"/>
-            <a:ext cx="9144000" cy="2387600"/>
+            <a:off x="3175" y="6400800"/>
+            <a:ext cx="12188825" cy="457200"/>
+          </a:xfrm>
+          <a:prstGeom prst="rect">
+            <a:avLst/>
+          </a:prstGeom>
+          <a:solidFill>
+            <a:schemeClr val="accent2"/>
+          </a:solidFill>
+          <a:ln>
+            <a:noFill/>
+          </a:ln>
+        </p:spPr>
+        <p:style>
+          <a:lnRef idx="2">
+            <a:schemeClr val="accent1">
+              <a:shade val="50000"/>
+            </a:schemeClr>
+          </a:lnRef>
+          <a:fillRef idx="1">
+            <a:schemeClr val="accent1"/>
+          </a:fillRef>
+          <a:effectRef idx="0">
+            <a:schemeClr val="accent1"/>
+          </a:effectRef>
+          <a:fontRef idx="minor">
+            <a:schemeClr val="lt1"/>
+          </a:fontRef>
+        </p:style>
+      </p:sp>
+      <p:sp>
+        <p:nvSpPr>
+          <p:cNvPr id="8" name="Rectangle 7"/>
+          <p:cNvSpPr/>
+          <p:nvPr/>
+        </p:nvSpPr>
+        <p:spPr>
+          <a:xfrm>
+            <a:off x="15" y="6334316"/>
+            <a:ext cx="12188825" cy="64008"/>
+          </a:xfrm>
+          <a:prstGeom prst="rect">
+            <a:avLst/>
+          </a:prstGeom>
+          <a:solidFill>
+            <a:schemeClr val="accent1"/>
+          </a:solidFill>
+          <a:ln>
+            <a:noFill/>
+          </a:ln>
+        </p:spPr>
+        <p:style>
+          <a:lnRef idx="2">
+            <a:schemeClr val="accent1">
+              <a:shade val="50000"/>
+            </a:schemeClr>
+          </a:lnRef>
+          <a:fillRef idx="1">
+            <a:schemeClr val="accent1"/>
+          </a:fillRef>
+          <a:effectRef idx="0">
+            <a:schemeClr val="accent1"/>
+          </a:effectRef>
+          <a:fontRef idx="minor">
+            <a:schemeClr val="lt1"/>
+          </a:fontRef>
+        </p:style>
+      </p:sp>
+      <p:sp>
+        <p:nvSpPr>
+          <p:cNvPr id="2" name="Title 1"/>
+          <p:cNvSpPr>
+            <a:spLocks noGrp="1"/>
+          </p:cNvSpPr>
+          <p:nvPr>
+            <p:ph type="ctrTitle"/>
+          </p:nvPr>
+        </p:nvSpPr>
+        <p:spPr>
+          <a:xfrm>
+            <a:off x="1097280" y="758952"/>
+            <a:ext cx="10058400" cy="3566160"/>
           </a:xfrm>
         </p:spPr>
         <p:txBody>
-          <a:bodyPr anchor="b"/>
+          <a:bodyPr anchor="b">
+            <a:normAutofit/>
+          </a:bodyPr>
           <a:lstStyle>
-            <a:lvl1pPr algn="ctr">
-              <a:defRPr sz="6000"/>
+            <a:lvl1pPr algn="l">
+              <a:lnSpc>
+                <a:spcPct val="85000"/>
+              </a:lnSpc>
+              <a:defRPr sz="8000" spc="-50" baseline="0">
+                <a:solidFill>
+                  <a:schemeClr val="tx1">
+                    <a:lumMod val="85000"/>
+                    <a:lumOff val="15000"/>
+                  </a:schemeClr>
+                </a:solidFill>
+              </a:defRPr>
             </a:lvl1pPr>
           </a:lstStyle>
           <a:p>
@@ -177,18 +259,13 @@
               <a:rPr lang="en-US"/>
               <a:t>Click to edit Master title style</a:t>
             </a:r>
-          </a:p>
-        </p:txBody>
-      </p:sp>
-      <p:sp>
-        <p:nvSpPr>
-          <p:cNvPr id="3" name="Subtitle 2">
-            <a:extLst>
-              <a:ext uri="{FF2B5EF4-FFF2-40B4-BE49-F238E27FC236}">
-                <a16:creationId xmlns:a16="http://schemas.microsoft.com/office/drawing/2014/main" id="{BA8B43CF-9651-4693-96A6-9CAD02D3A305}"/>
-              </a:ext>
-            </a:extLst>
-          </p:cNvPr>
+            <a:endParaRPr lang="en-US" dirty="0"/>
+          </a:p>
+        </p:txBody>
+      </p:sp>
+      <p:sp>
+        <p:nvSpPr>
+          <p:cNvPr id="3" name="Subtitle 2"/>
           <p:cNvSpPr>
             <a:spLocks noGrp="1"/>
           </p:cNvSpPr>
@@ -198,48 +275,55 @@
         </p:nvSpPr>
         <p:spPr>
           <a:xfrm>
-            <a:off x="1524000" y="3602038"/>
-            <a:ext cx="9144000" cy="1655762"/>
+            <a:off x="1100051" y="4455620"/>
+            <a:ext cx="10058400" cy="1143000"/>
           </a:xfrm>
         </p:spPr>
         <p:txBody>
-          <a:bodyPr/>
+          <a:bodyPr lIns="91440" rIns="91440">
+            <a:normAutofit/>
+          </a:bodyPr>
           <a:lstStyle>
-            <a:lvl1pPr marL="0" indent="0" algn="ctr">
+            <a:lvl1pPr marL="0" indent="0" algn="l">
               <a:buNone/>
-              <a:defRPr sz="2400"/>
+              <a:defRPr sz="2400" cap="all" spc="200" baseline="0">
+                <a:solidFill>
+                  <a:schemeClr val="tx2"/>
+                </a:solidFill>
+                <a:latin typeface="+mj-lt"/>
+              </a:defRPr>
             </a:lvl1pPr>
             <a:lvl2pPr marL="457200" indent="0" algn="ctr">
               <a:buNone/>
-              <a:defRPr sz="2000"/>
+              <a:defRPr sz="2400"/>
             </a:lvl2pPr>
             <a:lvl3pPr marL="914400" indent="0" algn="ctr">
               <a:buNone/>
-              <a:defRPr sz="1800"/>
+              <a:defRPr sz="2400"/>
             </a:lvl3pPr>
             <a:lvl4pPr marL="1371600" indent="0" algn="ctr">
               <a:buNone/>
-              <a:defRPr sz="1600"/>
+              <a:defRPr sz="2000"/>
             </a:lvl4pPr>
             <a:lvl5pPr marL="1828800" indent="0" algn="ctr">
               <a:buNone/>
-              <a:defRPr sz="1600"/>
+              <a:defRPr sz="2000"/>
             </a:lvl5pPr>
             <a:lvl6pPr marL="2286000" indent="0" algn="ctr">
               <a:buNone/>
-              <a:defRPr sz="1600"/>
+              <a:defRPr sz="2000"/>
             </a:lvl6pPr>
             <a:lvl7pPr marL="2743200" indent="0" algn="ctr">
               <a:buNone/>
-              <a:defRPr sz="1600"/>
+              <a:defRPr sz="2000"/>
             </a:lvl7pPr>
             <a:lvl8pPr marL="3200400" indent="0" algn="ctr">
               <a:buNone/>
-              <a:defRPr sz="1600"/>
+              <a:defRPr sz="2000"/>
             </a:lvl8pPr>
             <a:lvl9pPr marL="3657600" indent="0" algn="ctr">
               <a:buNone/>
-              <a:defRPr sz="1600"/>
+              <a:defRPr sz="2000"/>
             </a:lvl9pPr>
           </a:lstStyle>
           <a:p>
@@ -247,18 +331,13 @@
               <a:rPr lang="en-US"/>
               <a:t>Click to edit Master subtitle style</a:t>
             </a:r>
-          </a:p>
-        </p:txBody>
-      </p:sp>
-      <p:sp>
-        <p:nvSpPr>
-          <p:cNvPr id="4" name="Date Placeholder 3">
-            <a:extLst>
-              <a:ext uri="{FF2B5EF4-FFF2-40B4-BE49-F238E27FC236}">
-                <a16:creationId xmlns:a16="http://schemas.microsoft.com/office/drawing/2014/main" id="{664BB47E-129B-4004-9B66-ECB36292FB67}"/>
-              </a:ext>
-            </a:extLst>
-          </p:cNvPr>
+            <a:endParaRPr lang="en-US" dirty="0"/>
+          </a:p>
+        </p:txBody>
+      </p:sp>
+      <p:sp>
+        <p:nvSpPr>
+          <p:cNvPr id="4" name="Date Placeholder 3"/>
           <p:cNvSpPr>
             <a:spLocks noGrp="1"/>
           </p:cNvSpPr>
@@ -281,13 +360,7 @@
       </p:sp>
       <p:sp>
         <p:nvSpPr>
-          <p:cNvPr id="5" name="Footer Placeholder 4">
-            <a:extLst>
-              <a:ext uri="{FF2B5EF4-FFF2-40B4-BE49-F238E27FC236}">
-                <a16:creationId xmlns:a16="http://schemas.microsoft.com/office/drawing/2014/main" id="{8FBDBA5A-DCEA-4B25-A213-1191FD07AC5F}"/>
-              </a:ext>
-            </a:extLst>
-          </p:cNvPr>
+          <p:cNvPr id="5" name="Footer Placeholder 4"/>
           <p:cNvSpPr>
             <a:spLocks noGrp="1"/>
           </p:cNvSpPr>
@@ -306,13 +379,7 @@
       </p:sp>
       <p:sp>
         <p:nvSpPr>
-          <p:cNvPr id="6" name="Slide Number Placeholder 5">
-            <a:extLst>
-              <a:ext uri="{FF2B5EF4-FFF2-40B4-BE49-F238E27FC236}">
-                <a16:creationId xmlns:a16="http://schemas.microsoft.com/office/drawing/2014/main" id="{9C19941F-D401-4422-BE0D-365C34CF01B0}"/>
-              </a:ext>
-            </a:extLst>
-          </p:cNvPr>
+          <p:cNvPr id="6" name="Slide Number Placeholder 5"/>
           <p:cNvSpPr>
             <a:spLocks noGrp="1"/>
           </p:cNvSpPr>
@@ -333,10 +400,48 @@
           </a:p>
         </p:txBody>
       </p:sp>
+      <p:cxnSp>
+        <p:nvCxnSpPr>
+          <p:cNvPr id="9" name="Straight Connector 8"/>
+          <p:cNvCxnSpPr/>
+          <p:nvPr/>
+        </p:nvCxnSpPr>
+        <p:spPr>
+          <a:xfrm>
+            <a:off x="1207658" y="4343400"/>
+            <a:ext cx="9875520" cy="0"/>
+          </a:xfrm>
+          <a:prstGeom prst="line">
+            <a:avLst/>
+          </a:prstGeom>
+          <a:ln w="6350">
+            <a:solidFill>
+              <a:schemeClr val="tx1">
+                <a:lumMod val="50000"/>
+                <a:lumOff val="50000"/>
+              </a:schemeClr>
+            </a:solidFill>
+          </a:ln>
+        </p:spPr>
+        <p:style>
+          <a:lnRef idx="1">
+            <a:schemeClr val="accent1"/>
+          </a:lnRef>
+          <a:fillRef idx="0">
+            <a:schemeClr val="accent1"/>
+          </a:fillRef>
+          <a:effectRef idx="0">
+            <a:schemeClr val="accent1"/>
+          </a:effectRef>
+          <a:fontRef idx="minor">
+            <a:schemeClr val="tx1"/>
+          </a:fontRef>
+        </p:style>
+      </p:cxnSp>
     </p:spTree>
     <p:extLst>
       <p:ext uri="{BB962C8B-B14F-4D97-AF65-F5344CB8AC3E}">
-        <p14:creationId xmlns:p14="http://schemas.microsoft.com/office/powerpoint/2010/main" val="638577143"/>
+        <p14:creationId xmlns:p14="http://schemas.microsoft.com/office/powerpoint/2010/main" val="880049996"/>
       </p:ext>
     </p:extLst>
   </p:cSld>
@@ -365,13 +470,7 @@
       </p:grpSpPr>
       <p:sp>
         <p:nvSpPr>
-          <p:cNvPr id="2" name="Title 1">
-            <a:extLst>
-              <a:ext uri="{FF2B5EF4-FFF2-40B4-BE49-F238E27FC236}">
-                <a16:creationId xmlns:a16="http://schemas.microsoft.com/office/drawing/2014/main" id="{E73433F9-20DC-4147-93D6-5AC8D5EC3AC0}"/>
-              </a:ext>
-            </a:extLst>
-          </p:cNvPr>
+          <p:cNvPr id="2" name="Title 1"/>
           <p:cNvSpPr>
             <a:spLocks noGrp="1"/>
           </p:cNvSpPr>
@@ -388,18 +487,13 @@
               <a:rPr lang="en-US"/>
               <a:t>Click to edit Master title style</a:t>
             </a:r>
-          </a:p>
-        </p:txBody>
-      </p:sp>
-      <p:sp>
-        <p:nvSpPr>
-          <p:cNvPr id="3" name="Vertical Text Placeholder 2">
-            <a:extLst>
-              <a:ext uri="{FF2B5EF4-FFF2-40B4-BE49-F238E27FC236}">
-                <a16:creationId xmlns:a16="http://schemas.microsoft.com/office/drawing/2014/main" id="{56035FCB-9ED1-4D9D-AD1A-93D9F8F3965C}"/>
-              </a:ext>
-            </a:extLst>
-          </p:cNvPr>
+            <a:endParaRPr lang="en-US" dirty="0"/>
+          </a:p>
+        </p:txBody>
+      </p:sp>
+      <p:sp>
+        <p:nvSpPr>
+          <p:cNvPr id="3" name="Vertical Text Placeholder 2"/>
           <p:cNvSpPr>
             <a:spLocks noGrp="1"/>
           </p:cNvSpPr>
@@ -409,7 +503,7 @@
         </p:nvSpPr>
         <p:spPr/>
         <p:txBody>
-          <a:bodyPr vert="eaVert"/>
+          <a:bodyPr vert="eaVert" lIns="45720" tIns="0" rIns="45720" bIns="0"/>
           <a:lstStyle/>
           <a:p>
             <a:pPr lvl="0"/>
@@ -445,18 +539,13 @@
               <a:rPr lang="en-US"/>
               <a:t>Fifth level</a:t>
             </a:r>
-          </a:p>
-        </p:txBody>
-      </p:sp>
-      <p:sp>
-        <p:nvSpPr>
-          <p:cNvPr id="4" name="Date Placeholder 3">
-            <a:extLst>
-              <a:ext uri="{FF2B5EF4-FFF2-40B4-BE49-F238E27FC236}">
-                <a16:creationId xmlns:a16="http://schemas.microsoft.com/office/drawing/2014/main" id="{118091F2-E2D8-4D4A-AB55-592632236D7F}"/>
-              </a:ext>
-            </a:extLst>
-          </p:cNvPr>
+            <a:endParaRPr lang="en-US" dirty="0"/>
+          </a:p>
+        </p:txBody>
+      </p:sp>
+      <p:sp>
+        <p:nvSpPr>
+          <p:cNvPr id="4" name="Date Placeholder 3"/>
           <p:cNvSpPr>
             <a:spLocks noGrp="1"/>
           </p:cNvSpPr>
@@ -479,13 +568,7 @@
       </p:sp>
       <p:sp>
         <p:nvSpPr>
-          <p:cNvPr id="5" name="Footer Placeholder 4">
-            <a:extLst>
-              <a:ext uri="{FF2B5EF4-FFF2-40B4-BE49-F238E27FC236}">
-                <a16:creationId xmlns:a16="http://schemas.microsoft.com/office/drawing/2014/main" id="{6102B19A-B594-47F2-9237-22CEBAD84FD6}"/>
-              </a:ext>
-            </a:extLst>
-          </p:cNvPr>
+          <p:cNvPr id="5" name="Footer Placeholder 4"/>
           <p:cNvSpPr>
             <a:spLocks noGrp="1"/>
           </p:cNvSpPr>
@@ -504,13 +587,7 @@
       </p:sp>
       <p:sp>
         <p:nvSpPr>
-          <p:cNvPr id="6" name="Slide Number Placeholder 5">
-            <a:extLst>
-              <a:ext uri="{FF2B5EF4-FFF2-40B4-BE49-F238E27FC236}">
-                <a16:creationId xmlns:a16="http://schemas.microsoft.com/office/drawing/2014/main" id="{8404EE13-FE90-4F6E-936A-FA213AAB8A79}"/>
-              </a:ext>
-            </a:extLst>
-          </p:cNvPr>
+          <p:cNvPr id="6" name="Slide Number Placeholder 5"/>
           <p:cNvSpPr>
             <a:spLocks noGrp="1"/>
           </p:cNvSpPr>
@@ -534,7 +611,7 @@
     </p:spTree>
     <p:extLst>
       <p:ext uri="{BB962C8B-B14F-4D97-AF65-F5344CB8AC3E}">
-        <p14:creationId xmlns:p14="http://schemas.microsoft.com/office/powerpoint/2010/main" val="3260620546"/>
+        <p14:creationId xmlns:p14="http://schemas.microsoft.com/office/powerpoint/2010/main" val="1389074116"/>
       </p:ext>
     </p:extLst>
   </p:cSld>
@@ -545,7 +622,7 @@
 </file>
 
 <file path=ppt/slideLayouts/slideLayout11.xml><?xml version="1.0" encoding="utf-8"?>
-<p:sldLayout xmlns:a="http://schemas.openxmlformats.org/drawingml/2006/main" xmlns:r="http://schemas.openxmlformats.org/officeDocument/2006/relationships" xmlns:p="http://schemas.openxmlformats.org/presentationml/2006/main" type="vertTitleAndTx" preserve="1">
+<p:sldLayout xmlns:a="http://schemas.openxmlformats.org/drawingml/2006/main" xmlns:r="http://schemas.openxmlformats.org/officeDocument/2006/relationships" xmlns:p="http://schemas.openxmlformats.org/presentationml/2006/main" showMasterSp="0" type="vertTitleAndTx" preserve="1">
   <p:cSld name="Vertical Title and Text">
     <p:spTree>
       <p:nvGrpSpPr>
@@ -563,24 +640,94 @@
       </p:grpSpPr>
       <p:sp>
         <p:nvSpPr>
-          <p:cNvPr id="2" name="Vertical Title 1">
-            <a:extLst>
-              <a:ext uri="{FF2B5EF4-FFF2-40B4-BE49-F238E27FC236}">
-                <a16:creationId xmlns:a16="http://schemas.microsoft.com/office/drawing/2014/main" id="{AE32E2DB-69B1-495B-A3DD-C6A7F0DAEE91}"/>
-              </a:ext>
-            </a:extLst>
-          </p:cNvPr>
-          <p:cNvSpPr>
-            <a:spLocks noGrp="1"/>
-          </p:cNvSpPr>
-          <p:nvPr>
-            <p:ph type="title" orient="vert"/>
-          </p:nvPr>
+          <p:cNvPr id="7" name="Rectangle 6"/>
+          <p:cNvSpPr/>
+          <p:nvPr/>
         </p:nvSpPr>
         <p:spPr>
           <a:xfrm>
-            <a:off x="8724900" y="365125"/>
-            <a:ext cx="2628900" cy="5811838"/>
+            <a:off x="3175" y="6400800"/>
+            <a:ext cx="12188825" cy="457200"/>
+          </a:xfrm>
+          <a:prstGeom prst="rect">
+            <a:avLst/>
+          </a:prstGeom>
+          <a:solidFill>
+            <a:schemeClr val="accent2"/>
+          </a:solidFill>
+          <a:ln>
+            <a:noFill/>
+          </a:ln>
+        </p:spPr>
+        <p:style>
+          <a:lnRef idx="2">
+            <a:schemeClr val="accent1">
+              <a:shade val="50000"/>
+            </a:schemeClr>
+          </a:lnRef>
+          <a:fillRef idx="1">
+            <a:schemeClr val="accent1"/>
+          </a:fillRef>
+          <a:effectRef idx="0">
+            <a:schemeClr val="accent1"/>
+          </a:effectRef>
+          <a:fontRef idx="minor">
+            <a:schemeClr val="lt1"/>
+          </a:fontRef>
+        </p:style>
+      </p:sp>
+      <p:sp>
+        <p:nvSpPr>
+          <p:cNvPr id="8" name="Rectangle 7"/>
+          <p:cNvSpPr/>
+          <p:nvPr/>
+        </p:nvSpPr>
+        <p:spPr>
+          <a:xfrm>
+            <a:off x="15" y="6334316"/>
+            <a:ext cx="12188825" cy="64008"/>
+          </a:xfrm>
+          <a:prstGeom prst="rect">
+            <a:avLst/>
+          </a:prstGeom>
+          <a:solidFill>
+            <a:schemeClr val="accent1"/>
+          </a:solidFill>
+          <a:ln>
+            <a:noFill/>
+          </a:ln>
+        </p:spPr>
+        <p:style>
+          <a:lnRef idx="2">
+            <a:schemeClr val="accent1">
+              <a:shade val="50000"/>
+            </a:schemeClr>
+          </a:lnRef>
+          <a:fillRef idx="1">
+            <a:schemeClr val="accent1"/>
+          </a:fillRef>
+          <a:effectRef idx="0">
+            <a:schemeClr val="accent1"/>
+          </a:effectRef>
+          <a:fontRef idx="minor">
+            <a:schemeClr val="lt1"/>
+          </a:fontRef>
+        </p:style>
+      </p:sp>
+      <p:sp>
+        <p:nvSpPr>
+          <p:cNvPr id="2" name="Vertical Title 1"/>
+          <p:cNvSpPr>
+            <a:spLocks noGrp="1"/>
+          </p:cNvSpPr>
+          <p:nvPr>
+            <p:ph type="title" orient="vert"/>
+          </p:nvPr>
+        </p:nvSpPr>
+        <p:spPr>
+          <a:xfrm>
+            <a:off x="8724900" y="414778"/>
+            <a:ext cx="2628900" cy="5757421"/>
           </a:xfrm>
         </p:spPr>
         <p:txBody>
@@ -591,18 +738,13 @@
               <a:rPr lang="en-US"/>
               <a:t>Click to edit Master title style</a:t>
             </a:r>
-          </a:p>
-        </p:txBody>
-      </p:sp>
-      <p:sp>
-        <p:nvSpPr>
-          <p:cNvPr id="3" name="Vertical Text Placeholder 2">
-            <a:extLst>
-              <a:ext uri="{FF2B5EF4-FFF2-40B4-BE49-F238E27FC236}">
-                <a16:creationId xmlns:a16="http://schemas.microsoft.com/office/drawing/2014/main" id="{48FD17C9-E399-4A42-8681-46DB1C6ACCED}"/>
-              </a:ext>
-            </a:extLst>
-          </p:cNvPr>
+            <a:endParaRPr lang="en-US" dirty="0"/>
+          </a:p>
+        </p:txBody>
+      </p:sp>
+      <p:sp>
+        <p:nvSpPr>
+          <p:cNvPr id="3" name="Vertical Text Placeholder 2"/>
           <p:cNvSpPr>
             <a:spLocks noGrp="1"/>
           </p:cNvSpPr>
@@ -612,12 +754,12 @@
         </p:nvSpPr>
         <p:spPr>
           <a:xfrm>
-            <a:off x="838200" y="365125"/>
-            <a:ext cx="7734300" cy="5811838"/>
+            <a:off x="838200" y="414778"/>
+            <a:ext cx="7734300" cy="5757422"/>
           </a:xfrm>
         </p:spPr>
         <p:txBody>
-          <a:bodyPr vert="eaVert"/>
+          <a:bodyPr vert="eaVert" lIns="45720" tIns="0" rIns="45720" bIns="0"/>
           <a:lstStyle/>
           <a:p>
             <a:pPr lvl="0"/>
@@ -653,18 +795,13 @@
               <a:rPr lang="en-US"/>
               <a:t>Fifth level</a:t>
             </a:r>
-          </a:p>
-        </p:txBody>
-      </p:sp>
-      <p:sp>
-        <p:nvSpPr>
-          <p:cNvPr id="4" name="Date Placeholder 3">
-            <a:extLst>
-              <a:ext uri="{FF2B5EF4-FFF2-40B4-BE49-F238E27FC236}">
-                <a16:creationId xmlns:a16="http://schemas.microsoft.com/office/drawing/2014/main" id="{7062B237-DA51-46FA-A0F6-82E3EAEEE452}"/>
-              </a:ext>
-            </a:extLst>
-          </p:cNvPr>
+            <a:endParaRPr lang="en-US" dirty="0"/>
+          </a:p>
+        </p:txBody>
+      </p:sp>
+      <p:sp>
+        <p:nvSpPr>
+          <p:cNvPr id="4" name="Date Placeholder 3"/>
           <p:cNvSpPr>
             <a:spLocks noGrp="1"/>
           </p:cNvSpPr>
@@ -687,13 +824,7 @@
       </p:sp>
       <p:sp>
         <p:nvSpPr>
-          <p:cNvPr id="5" name="Footer Placeholder 4">
-            <a:extLst>
-              <a:ext uri="{FF2B5EF4-FFF2-40B4-BE49-F238E27FC236}">
-                <a16:creationId xmlns:a16="http://schemas.microsoft.com/office/drawing/2014/main" id="{684886F8-6DFA-4BD5-BB1C-B353158046E5}"/>
-              </a:ext>
-            </a:extLst>
-          </p:cNvPr>
+          <p:cNvPr id="5" name="Footer Placeholder 4"/>
           <p:cNvSpPr>
             <a:spLocks noGrp="1"/>
           </p:cNvSpPr>
@@ -712,13 +843,7 @@
       </p:sp>
       <p:sp>
         <p:nvSpPr>
-          <p:cNvPr id="6" name="Slide Number Placeholder 5">
-            <a:extLst>
-              <a:ext uri="{FF2B5EF4-FFF2-40B4-BE49-F238E27FC236}">
-                <a16:creationId xmlns:a16="http://schemas.microsoft.com/office/drawing/2014/main" id="{98222EEA-E5C7-4FAC-835F-77CF928AD3E1}"/>
-              </a:ext>
-            </a:extLst>
-          </p:cNvPr>
+          <p:cNvPr id="6" name="Slide Number Placeholder 5"/>
           <p:cNvSpPr>
             <a:spLocks noGrp="1"/>
           </p:cNvSpPr>
@@ -742,7 +867,7 @@
     </p:spTree>
     <p:extLst>
       <p:ext uri="{BB962C8B-B14F-4D97-AF65-F5344CB8AC3E}">
-        <p14:creationId xmlns:p14="http://schemas.microsoft.com/office/powerpoint/2010/main" val="2225636718"/>
+        <p14:creationId xmlns:p14="http://schemas.microsoft.com/office/powerpoint/2010/main" val="292634100"/>
       </p:ext>
     </p:extLst>
   </p:cSld>
@@ -771,13 +896,7 @@
       </p:grpSpPr>
       <p:sp>
         <p:nvSpPr>
-          <p:cNvPr id="2" name="Title 1">
-            <a:extLst>
-              <a:ext uri="{FF2B5EF4-FFF2-40B4-BE49-F238E27FC236}">
-                <a16:creationId xmlns:a16="http://schemas.microsoft.com/office/drawing/2014/main" id="{6B9509B4-479C-4051-B6E1-5B6714E28A35}"/>
-              </a:ext>
-            </a:extLst>
-          </p:cNvPr>
+          <p:cNvPr id="2" name="Title 1"/>
           <p:cNvSpPr>
             <a:spLocks noGrp="1"/>
           </p:cNvSpPr>
@@ -788,24 +907,23 @@
         <p:spPr/>
         <p:txBody>
           <a:bodyPr/>
-          <a:lstStyle/>
+          <a:lstStyle>
+            <a:lvl1pPr marL="0">
+              <a:defRPr/>
+            </a:lvl1pPr>
+          </a:lstStyle>
           <a:p>
             <a:r>
               <a:rPr lang="en-US"/>
               <a:t>Click to edit Master title style</a:t>
             </a:r>
-          </a:p>
-        </p:txBody>
-      </p:sp>
-      <p:sp>
-        <p:nvSpPr>
-          <p:cNvPr id="3" name="Content Placeholder 2">
-            <a:extLst>
-              <a:ext uri="{FF2B5EF4-FFF2-40B4-BE49-F238E27FC236}">
-                <a16:creationId xmlns:a16="http://schemas.microsoft.com/office/drawing/2014/main" id="{1F201D62-0ED9-4E03-99F3-7B13FDCF2A96}"/>
-              </a:ext>
-            </a:extLst>
-          </p:cNvPr>
+            <a:endParaRPr lang="en-US" dirty="0"/>
+          </a:p>
+        </p:txBody>
+      </p:sp>
+      <p:sp>
+        <p:nvSpPr>
+          <p:cNvPr id="3" name="Content Placeholder 2"/>
           <p:cNvSpPr>
             <a:spLocks noGrp="1"/>
           </p:cNvSpPr>
@@ -851,18 +969,13 @@
               <a:rPr lang="en-US"/>
               <a:t>Fifth level</a:t>
             </a:r>
-          </a:p>
-        </p:txBody>
-      </p:sp>
-      <p:sp>
-        <p:nvSpPr>
-          <p:cNvPr id="4" name="Date Placeholder 3">
-            <a:extLst>
-              <a:ext uri="{FF2B5EF4-FFF2-40B4-BE49-F238E27FC236}">
-                <a16:creationId xmlns:a16="http://schemas.microsoft.com/office/drawing/2014/main" id="{C0C92937-A79E-44FE-8579-DB7EE431A09D}"/>
-              </a:ext>
-            </a:extLst>
-          </p:cNvPr>
+            <a:endParaRPr lang="en-US" dirty="0"/>
+          </a:p>
+        </p:txBody>
+      </p:sp>
+      <p:sp>
+        <p:nvSpPr>
+          <p:cNvPr id="4" name="Date Placeholder 3"/>
           <p:cNvSpPr>
             <a:spLocks noGrp="1"/>
           </p:cNvSpPr>
@@ -885,13 +998,7 @@
       </p:sp>
       <p:sp>
         <p:nvSpPr>
-          <p:cNvPr id="5" name="Footer Placeholder 4">
-            <a:extLst>
-              <a:ext uri="{FF2B5EF4-FFF2-40B4-BE49-F238E27FC236}">
-                <a16:creationId xmlns:a16="http://schemas.microsoft.com/office/drawing/2014/main" id="{9ED3431A-F04C-4ED0-9C00-51451999D244}"/>
-              </a:ext>
-            </a:extLst>
-          </p:cNvPr>
+          <p:cNvPr id="5" name="Footer Placeholder 4"/>
           <p:cNvSpPr>
             <a:spLocks noGrp="1"/>
           </p:cNvSpPr>
@@ -910,13 +1017,7 @@
       </p:sp>
       <p:sp>
         <p:nvSpPr>
-          <p:cNvPr id="6" name="Slide Number Placeholder 5">
-            <a:extLst>
-              <a:ext uri="{FF2B5EF4-FFF2-40B4-BE49-F238E27FC236}">
-                <a16:creationId xmlns:a16="http://schemas.microsoft.com/office/drawing/2014/main" id="{2F7CFFC6-528B-4EC3-9B70-7C1133318360}"/>
-              </a:ext>
-            </a:extLst>
-          </p:cNvPr>
+          <p:cNvPr id="6" name="Slide Number Placeholder 5"/>
           <p:cNvSpPr>
             <a:spLocks noGrp="1"/>
           </p:cNvSpPr>
@@ -940,7 +1041,7 @@
     </p:spTree>
     <p:extLst>
       <p:ext uri="{BB962C8B-B14F-4D97-AF65-F5344CB8AC3E}">
-        <p14:creationId xmlns:p14="http://schemas.microsoft.com/office/powerpoint/2010/main" val="1387987331"/>
+        <p14:creationId xmlns:p14="http://schemas.microsoft.com/office/powerpoint/2010/main" val="2643919849"/>
       </p:ext>
     </p:extLst>
   </p:cSld>
@@ -951,8 +1052,16 @@
 </file>
 
 <file path=ppt/slideLayouts/slideLayout3.xml><?xml version="1.0" encoding="utf-8"?>
-<p:sldLayout xmlns:a="http://schemas.openxmlformats.org/drawingml/2006/main" xmlns:r="http://schemas.openxmlformats.org/officeDocument/2006/relationships" xmlns:p="http://schemas.openxmlformats.org/presentationml/2006/main" type="secHead" preserve="1">
+<p:sldLayout xmlns:a="http://schemas.openxmlformats.org/drawingml/2006/main" xmlns:r="http://schemas.openxmlformats.org/officeDocument/2006/relationships" xmlns:p="http://schemas.openxmlformats.org/presentationml/2006/main" showMasterSp="0" type="secHead" preserve="1">
   <p:cSld name="Section Header">
+    <p:bg>
+      <p:bgPr>
+        <a:solidFill>
+          <a:schemeClr val="bg1"/>
+        </a:solidFill>
+        <a:effectLst/>
+      </p:bgPr>
+    </p:bg>
     <p:spTree>
       <p:nvGrpSpPr>
         <p:cNvPr id="1" name=""/>
@@ -969,79 +1078,157 @@
       </p:grpSpPr>
       <p:sp>
         <p:nvSpPr>
-          <p:cNvPr id="2" name="Title 1">
-            <a:extLst>
-              <a:ext uri="{FF2B5EF4-FFF2-40B4-BE49-F238E27FC236}">
-                <a16:creationId xmlns:a16="http://schemas.microsoft.com/office/drawing/2014/main" id="{81474375-F46B-4261-BBD0-AEC7DA19C062}"/>
-              </a:ext>
-            </a:extLst>
-          </p:cNvPr>
-          <p:cNvSpPr>
-            <a:spLocks noGrp="1"/>
-          </p:cNvSpPr>
-          <p:nvPr>
-            <p:ph type="title"/>
-          </p:nvPr>
+          <p:cNvPr id="7" name="Rectangle 6"/>
+          <p:cNvSpPr/>
+          <p:nvPr/>
         </p:nvSpPr>
         <p:spPr>
           <a:xfrm>
-            <a:off x="831850" y="1709738"/>
-            <a:ext cx="10515600" cy="2852737"/>
+            <a:off x="3175" y="6400800"/>
+            <a:ext cx="12188825" cy="457200"/>
+          </a:xfrm>
+          <a:prstGeom prst="rect">
+            <a:avLst/>
+          </a:prstGeom>
+          <a:solidFill>
+            <a:schemeClr val="accent2"/>
+          </a:solidFill>
+          <a:ln>
+            <a:noFill/>
+          </a:ln>
+        </p:spPr>
+        <p:style>
+          <a:lnRef idx="2">
+            <a:schemeClr val="accent1">
+              <a:shade val="50000"/>
+            </a:schemeClr>
+          </a:lnRef>
+          <a:fillRef idx="1">
+            <a:schemeClr val="accent1"/>
+          </a:fillRef>
+          <a:effectRef idx="0">
+            <a:schemeClr val="accent1"/>
+          </a:effectRef>
+          <a:fontRef idx="minor">
+            <a:schemeClr val="lt1"/>
+          </a:fontRef>
+        </p:style>
+      </p:sp>
+      <p:sp>
+        <p:nvSpPr>
+          <p:cNvPr id="8" name="Rectangle 7"/>
+          <p:cNvSpPr/>
+          <p:nvPr/>
+        </p:nvSpPr>
+        <p:spPr>
+          <a:xfrm>
+            <a:off x="15" y="6334316"/>
+            <a:ext cx="12188825" cy="64008"/>
+          </a:xfrm>
+          <a:prstGeom prst="rect">
+            <a:avLst/>
+          </a:prstGeom>
+          <a:solidFill>
+            <a:schemeClr val="accent1"/>
+          </a:solidFill>
+          <a:ln>
+            <a:noFill/>
+          </a:ln>
+        </p:spPr>
+        <p:style>
+          <a:lnRef idx="2">
+            <a:schemeClr val="accent1">
+              <a:shade val="50000"/>
+            </a:schemeClr>
+          </a:lnRef>
+          <a:fillRef idx="1">
+            <a:schemeClr val="accent1"/>
+          </a:fillRef>
+          <a:effectRef idx="0">
+            <a:schemeClr val="accent1"/>
+          </a:effectRef>
+          <a:fontRef idx="minor">
+            <a:schemeClr val="lt1"/>
+          </a:fontRef>
+        </p:style>
+      </p:sp>
+      <p:sp>
+        <p:nvSpPr>
+          <p:cNvPr id="2" name="Title 1"/>
+          <p:cNvSpPr>
+            <a:spLocks noGrp="1"/>
+          </p:cNvSpPr>
+          <p:nvPr>
+            <p:ph type="title"/>
+          </p:nvPr>
+        </p:nvSpPr>
+        <p:spPr>
+          <a:xfrm>
+            <a:off x="1097280" y="758952"/>
+            <a:ext cx="10058400" cy="3566160"/>
           </a:xfrm>
         </p:spPr>
         <p:txBody>
-          <a:bodyPr anchor="b"/>
+          <a:bodyPr anchor="b" anchorCtr="0">
+            <a:normAutofit/>
+          </a:bodyPr>
           <a:lstStyle>
             <a:lvl1pPr>
-              <a:defRPr sz="6000"/>
-            </a:lvl1pPr>
-          </a:lstStyle>
-          <a:p>
-            <a:r>
-              <a:rPr lang="en-US"/>
-              <a:t>Click to edit Master title style</a:t>
-            </a:r>
-          </a:p>
-        </p:txBody>
-      </p:sp>
-      <p:sp>
-        <p:nvSpPr>
-          <p:cNvPr id="3" name="Text Placeholder 2">
-            <a:extLst>
-              <a:ext uri="{FF2B5EF4-FFF2-40B4-BE49-F238E27FC236}">
-                <a16:creationId xmlns:a16="http://schemas.microsoft.com/office/drawing/2014/main" id="{4753E352-E60C-4871-8E65-784EB28D8D37}"/>
-              </a:ext>
-            </a:extLst>
-          </p:cNvPr>
-          <p:cNvSpPr>
-            <a:spLocks noGrp="1"/>
-          </p:cNvSpPr>
-          <p:nvPr>
-            <p:ph type="body" idx="1"/>
-          </p:nvPr>
-        </p:nvSpPr>
-        <p:spPr>
-          <a:xfrm>
-            <a:off x="831850" y="4589463"/>
-            <a:ext cx="10515600" cy="1500187"/>
-          </a:xfrm>
-        </p:spPr>
-        <p:txBody>
-          <a:bodyPr/>
-          <a:lstStyle>
-            <a:lvl1pPr marL="0" indent="0">
-              <a:buNone/>
-              <a:defRPr sz="2400">
+              <a:lnSpc>
+                <a:spcPct val="85000"/>
+              </a:lnSpc>
+              <a:defRPr sz="8000" b="0">
                 <a:solidFill>
                   <a:schemeClr val="tx1">
-                    <a:tint val="75000"/>
+                    <a:lumMod val="85000"/>
+                    <a:lumOff val="15000"/>
                   </a:schemeClr>
                 </a:solidFill>
               </a:defRPr>
             </a:lvl1pPr>
+          </a:lstStyle>
+          <a:p>
+            <a:r>
+              <a:rPr lang="en-US"/>
+              <a:t>Click to edit Master title style</a:t>
+            </a:r>
+            <a:endParaRPr lang="en-US" dirty="0"/>
+          </a:p>
+        </p:txBody>
+      </p:sp>
+      <p:sp>
+        <p:nvSpPr>
+          <p:cNvPr id="3" name="Text Placeholder 2"/>
+          <p:cNvSpPr>
+            <a:spLocks noGrp="1"/>
+          </p:cNvSpPr>
+          <p:nvPr>
+            <p:ph type="body" idx="1"/>
+          </p:nvPr>
+        </p:nvSpPr>
+        <p:spPr>
+          <a:xfrm>
+            <a:off x="1097280" y="4453128"/>
+            <a:ext cx="10058400" cy="1143000"/>
+          </a:xfrm>
+        </p:spPr>
+        <p:txBody>
+          <a:bodyPr lIns="91440" rIns="91440" anchor="t" anchorCtr="0">
+            <a:normAutofit/>
+          </a:bodyPr>
+          <a:lstStyle>
+            <a:lvl1pPr marL="0" indent="0">
+              <a:buNone/>
+              <a:defRPr sz="2400" cap="all" spc="200" baseline="0">
+                <a:solidFill>
+                  <a:schemeClr val="tx2"/>
+                </a:solidFill>
+                <a:latin typeface="+mj-lt"/>
+              </a:defRPr>
+            </a:lvl1pPr>
             <a:lvl2pPr marL="457200" indent="0">
               <a:buNone/>
-              <a:defRPr sz="2000">
+              <a:defRPr sz="1800">
                 <a:solidFill>
                   <a:schemeClr val="tx1">
                     <a:tint val="75000"/>
@@ -1051,7 +1238,7 @@
             </a:lvl2pPr>
             <a:lvl3pPr marL="914400" indent="0">
               <a:buNone/>
-              <a:defRPr sz="1800">
+              <a:defRPr sz="1600">
                 <a:solidFill>
                   <a:schemeClr val="tx1">
                     <a:tint val="75000"/>
@@ -1061,7 +1248,7 @@
             </a:lvl3pPr>
             <a:lvl4pPr marL="1371600" indent="0">
               <a:buNone/>
-              <a:defRPr sz="1600">
+              <a:defRPr sz="1400">
                 <a:solidFill>
                   <a:schemeClr val="tx1">
                     <a:tint val="75000"/>
@@ -1071,7 +1258,7 @@
             </a:lvl4pPr>
             <a:lvl5pPr marL="1828800" indent="0">
               <a:buNone/>
-              <a:defRPr sz="1600">
+              <a:defRPr sz="1400">
                 <a:solidFill>
                   <a:schemeClr val="tx1">
                     <a:tint val="75000"/>
@@ -1081,7 +1268,7 @@
             </a:lvl5pPr>
             <a:lvl6pPr marL="2286000" indent="0">
               <a:buNone/>
-              <a:defRPr sz="1600">
+              <a:defRPr sz="1400">
                 <a:solidFill>
                   <a:schemeClr val="tx1">
                     <a:tint val="75000"/>
@@ -1091,7 +1278,7 @@
             </a:lvl6pPr>
             <a:lvl7pPr marL="2743200" indent="0">
               <a:buNone/>
-              <a:defRPr sz="1600">
+              <a:defRPr sz="1400">
                 <a:solidFill>
                   <a:schemeClr val="tx1">
                     <a:tint val="75000"/>
@@ -1101,7 +1288,7 @@
             </a:lvl7pPr>
             <a:lvl8pPr marL="3200400" indent="0">
               <a:buNone/>
-              <a:defRPr sz="1600">
+              <a:defRPr sz="1400">
                 <a:solidFill>
                   <a:schemeClr val="tx1">
                     <a:tint val="75000"/>
@@ -1111,7 +1298,7 @@
             </a:lvl8pPr>
             <a:lvl9pPr marL="3657600" indent="0">
               <a:buNone/>
-              <a:defRPr sz="1600">
+              <a:defRPr sz="1400">
                 <a:solidFill>
                   <a:schemeClr val="tx1">
                     <a:tint val="75000"/>
@@ -1131,13 +1318,7 @@
       </p:sp>
       <p:sp>
         <p:nvSpPr>
-          <p:cNvPr id="4" name="Date Placeholder 3">
-            <a:extLst>
-              <a:ext uri="{FF2B5EF4-FFF2-40B4-BE49-F238E27FC236}">
-                <a16:creationId xmlns:a16="http://schemas.microsoft.com/office/drawing/2014/main" id="{B155111A-3133-4915-8B13-1011CC520E7F}"/>
-              </a:ext>
-            </a:extLst>
-          </p:cNvPr>
+          <p:cNvPr id="4" name="Date Placeholder 3"/>
           <p:cNvSpPr>
             <a:spLocks noGrp="1"/>
           </p:cNvSpPr>
@@ -1160,13 +1341,7 @@
       </p:sp>
       <p:sp>
         <p:nvSpPr>
-          <p:cNvPr id="5" name="Footer Placeholder 4">
-            <a:extLst>
-              <a:ext uri="{FF2B5EF4-FFF2-40B4-BE49-F238E27FC236}">
-                <a16:creationId xmlns:a16="http://schemas.microsoft.com/office/drawing/2014/main" id="{C93C6119-26F7-4942-9839-461B758BEF03}"/>
-              </a:ext>
-            </a:extLst>
-          </p:cNvPr>
+          <p:cNvPr id="5" name="Footer Placeholder 4"/>
           <p:cNvSpPr>
             <a:spLocks noGrp="1"/>
           </p:cNvSpPr>
@@ -1185,13 +1360,7 @@
       </p:sp>
       <p:sp>
         <p:nvSpPr>
-          <p:cNvPr id="6" name="Slide Number Placeholder 5">
-            <a:extLst>
-              <a:ext uri="{FF2B5EF4-FFF2-40B4-BE49-F238E27FC236}">
-                <a16:creationId xmlns:a16="http://schemas.microsoft.com/office/drawing/2014/main" id="{01106B75-1C9C-4376-9956-828AC3E1BEDB}"/>
-              </a:ext>
-            </a:extLst>
-          </p:cNvPr>
+          <p:cNvPr id="6" name="Slide Number Placeholder 5"/>
           <p:cNvSpPr>
             <a:spLocks noGrp="1"/>
           </p:cNvSpPr>
@@ -1212,10 +1381,48 @@
           </a:p>
         </p:txBody>
       </p:sp>
+      <p:cxnSp>
+        <p:nvCxnSpPr>
+          <p:cNvPr id="9" name="Straight Connector 8"/>
+          <p:cNvCxnSpPr/>
+          <p:nvPr/>
+        </p:nvCxnSpPr>
+        <p:spPr>
+          <a:xfrm>
+            <a:off x="1207658" y="4343400"/>
+            <a:ext cx="9875520" cy="0"/>
+          </a:xfrm>
+          <a:prstGeom prst="line">
+            <a:avLst/>
+          </a:prstGeom>
+          <a:ln w="6350">
+            <a:solidFill>
+              <a:schemeClr val="tx1">
+                <a:lumMod val="50000"/>
+                <a:lumOff val="50000"/>
+              </a:schemeClr>
+            </a:solidFill>
+          </a:ln>
+        </p:spPr>
+        <p:style>
+          <a:lnRef idx="1">
+            <a:schemeClr val="accent1"/>
+          </a:lnRef>
+          <a:fillRef idx="0">
+            <a:schemeClr val="accent1"/>
+          </a:fillRef>
+          <a:effectRef idx="0">
+            <a:schemeClr val="accent1"/>
+          </a:effectRef>
+          <a:fontRef idx="minor">
+            <a:schemeClr val="tx1"/>
+          </a:fontRef>
+        </p:style>
+      </p:cxnSp>
     </p:spTree>
     <p:extLst>
       <p:ext uri="{BB962C8B-B14F-4D97-AF65-F5344CB8AC3E}">
-        <p14:creationId xmlns:p14="http://schemas.microsoft.com/office/powerpoint/2010/main" val="3677507618"/>
+        <p14:creationId xmlns:p14="http://schemas.microsoft.com/office/powerpoint/2010/main" val="3321500590"/>
       </p:ext>
     </p:extLst>
   </p:cSld>
@@ -1244,13 +1451,7 @@
       </p:grpSpPr>
       <p:sp>
         <p:nvSpPr>
-          <p:cNvPr id="2" name="Title 1">
-            <a:extLst>
-              <a:ext uri="{FF2B5EF4-FFF2-40B4-BE49-F238E27FC236}">
-                <a16:creationId xmlns:a16="http://schemas.microsoft.com/office/drawing/2014/main" id="{0F2E9B00-71D2-47C8-8999-1EDEAFF2BC0A}"/>
-              </a:ext>
-            </a:extLst>
-          </p:cNvPr>
+          <p:cNvPr id="8" name="Title 7"/>
           <p:cNvSpPr>
             <a:spLocks noGrp="1"/>
           </p:cNvSpPr>
@@ -1258,7 +1459,12 @@
             <p:ph type="title"/>
           </p:nvPr>
         </p:nvSpPr>
-        <p:spPr/>
+        <p:spPr>
+          <a:xfrm>
+            <a:off x="1097280" y="286603"/>
+            <a:ext cx="10058400" cy="1450757"/>
+          </a:xfrm>
+        </p:spPr>
         <p:txBody>
           <a:bodyPr/>
           <a:lstStyle/>
@@ -1267,18 +1473,13 @@
               <a:rPr lang="en-US"/>
               <a:t>Click to edit Master title style</a:t>
             </a:r>
-          </a:p>
-        </p:txBody>
-      </p:sp>
-      <p:sp>
-        <p:nvSpPr>
-          <p:cNvPr id="3" name="Content Placeholder 2">
-            <a:extLst>
-              <a:ext uri="{FF2B5EF4-FFF2-40B4-BE49-F238E27FC236}">
-                <a16:creationId xmlns:a16="http://schemas.microsoft.com/office/drawing/2014/main" id="{709DDB4F-DA64-40D2-9921-438171EF51DC}"/>
-              </a:ext>
-            </a:extLst>
-          </p:cNvPr>
+            <a:endParaRPr lang="en-US" dirty="0"/>
+          </a:p>
+        </p:txBody>
+      </p:sp>
+      <p:sp>
+        <p:nvSpPr>
+          <p:cNvPr id="3" name="Content Placeholder 2"/>
           <p:cNvSpPr>
             <a:spLocks noGrp="1"/>
           </p:cNvSpPr>
@@ -1288,8 +1489,8 @@
         </p:nvSpPr>
         <p:spPr>
           <a:xfrm>
-            <a:off x="838200" y="1825625"/>
-            <a:ext cx="5181600" cy="4351338"/>
+            <a:off x="1097279" y="1845734"/>
+            <a:ext cx="4937760" cy="4023360"/>
           </a:xfrm>
         </p:spPr>
         <p:txBody>
@@ -1329,18 +1530,13 @@
               <a:rPr lang="en-US"/>
               <a:t>Fifth level</a:t>
             </a:r>
-          </a:p>
-        </p:txBody>
-      </p:sp>
-      <p:sp>
-        <p:nvSpPr>
-          <p:cNvPr id="4" name="Content Placeholder 3">
-            <a:extLst>
-              <a:ext uri="{FF2B5EF4-FFF2-40B4-BE49-F238E27FC236}">
-                <a16:creationId xmlns:a16="http://schemas.microsoft.com/office/drawing/2014/main" id="{7CF971AC-E878-4C89-B6FA-04BF821D0420}"/>
-              </a:ext>
-            </a:extLst>
-          </p:cNvPr>
+            <a:endParaRPr lang="en-US" dirty="0"/>
+          </a:p>
+        </p:txBody>
+      </p:sp>
+      <p:sp>
+        <p:nvSpPr>
+          <p:cNvPr id="4" name="Content Placeholder 3"/>
           <p:cNvSpPr>
             <a:spLocks noGrp="1"/>
           </p:cNvSpPr>
@@ -1350,8 +1546,8 @@
         </p:nvSpPr>
         <p:spPr>
           <a:xfrm>
-            <a:off x="6172200" y="1825625"/>
-            <a:ext cx="5181600" cy="4351338"/>
+            <a:off x="6217920" y="1845735"/>
+            <a:ext cx="4937760" cy="4023360"/>
           </a:xfrm>
         </p:spPr>
         <p:txBody>
@@ -1391,18 +1587,13 @@
               <a:rPr lang="en-US"/>
               <a:t>Fifth level</a:t>
             </a:r>
-          </a:p>
-        </p:txBody>
-      </p:sp>
-      <p:sp>
-        <p:nvSpPr>
-          <p:cNvPr id="5" name="Date Placeholder 4">
-            <a:extLst>
-              <a:ext uri="{FF2B5EF4-FFF2-40B4-BE49-F238E27FC236}">
-                <a16:creationId xmlns:a16="http://schemas.microsoft.com/office/drawing/2014/main" id="{9EEC17CF-23EB-4EA8-81A6-02C52BCC5E6E}"/>
-              </a:ext>
-            </a:extLst>
-          </p:cNvPr>
+            <a:endParaRPr lang="en-US" dirty="0"/>
+          </a:p>
+        </p:txBody>
+      </p:sp>
+      <p:sp>
+        <p:nvSpPr>
+          <p:cNvPr id="5" name="Date Placeholder 4"/>
           <p:cNvSpPr>
             <a:spLocks noGrp="1"/>
           </p:cNvSpPr>
@@ -1425,13 +1616,7 @@
       </p:sp>
       <p:sp>
         <p:nvSpPr>
-          <p:cNvPr id="6" name="Footer Placeholder 5">
-            <a:extLst>
-              <a:ext uri="{FF2B5EF4-FFF2-40B4-BE49-F238E27FC236}">
-                <a16:creationId xmlns:a16="http://schemas.microsoft.com/office/drawing/2014/main" id="{39C12BB2-4B46-4F39-BCCC-064B96B90E12}"/>
-              </a:ext>
-            </a:extLst>
-          </p:cNvPr>
+          <p:cNvPr id="6" name="Footer Placeholder 5"/>
           <p:cNvSpPr>
             <a:spLocks noGrp="1"/>
           </p:cNvSpPr>
@@ -1450,13 +1635,7 @@
       </p:sp>
       <p:sp>
         <p:nvSpPr>
-          <p:cNvPr id="7" name="Slide Number Placeholder 6">
-            <a:extLst>
-              <a:ext uri="{FF2B5EF4-FFF2-40B4-BE49-F238E27FC236}">
-                <a16:creationId xmlns:a16="http://schemas.microsoft.com/office/drawing/2014/main" id="{9664B721-3B0F-43A7-B337-8497F2A892AE}"/>
-              </a:ext>
-            </a:extLst>
-          </p:cNvPr>
+          <p:cNvPr id="7" name="Slide Number Placeholder 6"/>
           <p:cNvSpPr>
             <a:spLocks noGrp="1"/>
           </p:cNvSpPr>
@@ -1480,7 +1659,7 @@
     </p:spTree>
     <p:extLst>
       <p:ext uri="{BB962C8B-B14F-4D97-AF65-F5344CB8AC3E}">
-        <p14:creationId xmlns:p14="http://schemas.microsoft.com/office/powerpoint/2010/main" val="3996931825"/>
+        <p14:creationId xmlns:p14="http://schemas.microsoft.com/office/powerpoint/2010/main" val="2460540712"/>
       </p:ext>
     </p:extLst>
   </p:cSld>
@@ -1509,13 +1688,7 @@
       </p:grpSpPr>
       <p:sp>
         <p:nvSpPr>
-          <p:cNvPr id="2" name="Title 1">
-            <a:extLst>
-              <a:ext uri="{FF2B5EF4-FFF2-40B4-BE49-F238E27FC236}">
-                <a16:creationId xmlns:a16="http://schemas.microsoft.com/office/drawing/2014/main" id="{05CF5A9A-C723-4A29-819B-17DA1B081B77}"/>
-              </a:ext>
-            </a:extLst>
-          </p:cNvPr>
+          <p:cNvPr id="10" name="Title 9"/>
           <p:cNvSpPr>
             <a:spLocks noGrp="1"/>
           </p:cNvSpPr>
@@ -1525,8 +1698,8 @@
         </p:nvSpPr>
         <p:spPr>
           <a:xfrm>
-            <a:off x="839788" y="365125"/>
-            <a:ext cx="10515600" cy="1325563"/>
+            <a:off x="1097280" y="286603"/>
+            <a:ext cx="10058400" cy="1450757"/>
           </a:xfrm>
         </p:spPr>
         <p:txBody>
@@ -1537,18 +1710,13 @@
               <a:rPr lang="en-US"/>
               <a:t>Click to edit Master title style</a:t>
             </a:r>
-          </a:p>
-        </p:txBody>
-      </p:sp>
-      <p:sp>
-        <p:nvSpPr>
-          <p:cNvPr id="3" name="Text Placeholder 2">
-            <a:extLst>
-              <a:ext uri="{FF2B5EF4-FFF2-40B4-BE49-F238E27FC236}">
-                <a16:creationId xmlns:a16="http://schemas.microsoft.com/office/drawing/2014/main" id="{CB90E0A4-FA11-4B61-9579-06E48678BF8F}"/>
-              </a:ext>
-            </a:extLst>
-          </p:cNvPr>
+            <a:endParaRPr lang="en-US" dirty="0"/>
+          </a:p>
+        </p:txBody>
+      </p:sp>
+      <p:sp>
+        <p:nvSpPr>
+          <p:cNvPr id="3" name="Text Placeholder 2"/>
           <p:cNvSpPr>
             <a:spLocks noGrp="1"/>
           </p:cNvSpPr>
@@ -1558,16 +1726,22 @@
         </p:nvSpPr>
         <p:spPr>
           <a:xfrm>
-            <a:off x="839788" y="1681163"/>
-            <a:ext cx="5157787" cy="823912"/>
+            <a:off x="1097280" y="1846052"/>
+            <a:ext cx="4937760" cy="736282"/>
           </a:xfrm>
         </p:spPr>
         <p:txBody>
-          <a:bodyPr anchor="b"/>
+          <a:bodyPr lIns="91440" rIns="91440" anchor="ctr">
+            <a:normAutofit/>
+          </a:bodyPr>
           <a:lstStyle>
             <a:lvl1pPr marL="0" indent="0">
               <a:buNone/>
-              <a:defRPr sz="2400" b="1"/>
+              <a:defRPr sz="2000" b="0" cap="all" baseline="0">
+                <a:solidFill>
+                  <a:schemeClr val="tx2"/>
+                </a:solidFill>
+              </a:defRPr>
             </a:lvl1pPr>
             <a:lvl2pPr marL="457200" indent="0">
               <a:buNone/>
@@ -1613,13 +1787,7 @@
       </p:sp>
       <p:sp>
         <p:nvSpPr>
-          <p:cNvPr id="4" name="Content Placeholder 3">
-            <a:extLst>
-              <a:ext uri="{FF2B5EF4-FFF2-40B4-BE49-F238E27FC236}">
-                <a16:creationId xmlns:a16="http://schemas.microsoft.com/office/drawing/2014/main" id="{EB9B6D25-B987-443D-9662-BEFBAA69093D}"/>
-              </a:ext>
-            </a:extLst>
-          </p:cNvPr>
+          <p:cNvPr id="4" name="Content Placeholder 3"/>
           <p:cNvSpPr>
             <a:spLocks noGrp="1"/>
           </p:cNvSpPr>
@@ -1629,8 +1797,8 @@
         </p:nvSpPr>
         <p:spPr>
           <a:xfrm>
-            <a:off x="839788" y="2505075"/>
-            <a:ext cx="5157787" cy="3684588"/>
+            <a:off x="1097280" y="2582334"/>
+            <a:ext cx="4937760" cy="3378200"/>
           </a:xfrm>
         </p:spPr>
         <p:txBody>
@@ -1670,18 +1838,13 @@
               <a:rPr lang="en-US"/>
               <a:t>Fifth level</a:t>
             </a:r>
-          </a:p>
-        </p:txBody>
-      </p:sp>
-      <p:sp>
-        <p:nvSpPr>
-          <p:cNvPr id="5" name="Text Placeholder 4">
-            <a:extLst>
-              <a:ext uri="{FF2B5EF4-FFF2-40B4-BE49-F238E27FC236}">
-                <a16:creationId xmlns:a16="http://schemas.microsoft.com/office/drawing/2014/main" id="{ECB7911C-292E-4049-A41B-D71C3A816EEB}"/>
-              </a:ext>
-            </a:extLst>
-          </p:cNvPr>
+            <a:endParaRPr lang="en-US" dirty="0"/>
+          </a:p>
+        </p:txBody>
+      </p:sp>
+      <p:sp>
+        <p:nvSpPr>
+          <p:cNvPr id="5" name="Text Placeholder 4"/>
           <p:cNvSpPr>
             <a:spLocks noGrp="1"/>
           </p:cNvSpPr>
@@ -1691,16 +1854,22 @@
         </p:nvSpPr>
         <p:spPr>
           <a:xfrm>
-            <a:off x="6172200" y="1681163"/>
-            <a:ext cx="5183188" cy="823912"/>
+            <a:off x="6217920" y="1846052"/>
+            <a:ext cx="4937760" cy="736282"/>
           </a:xfrm>
         </p:spPr>
         <p:txBody>
-          <a:bodyPr anchor="b"/>
+          <a:bodyPr lIns="91440" rIns="91440" anchor="ctr">
+            <a:normAutofit/>
+          </a:bodyPr>
           <a:lstStyle>
             <a:lvl1pPr marL="0" indent="0">
               <a:buNone/>
-              <a:defRPr sz="2400" b="1"/>
+              <a:defRPr sz="2000" b="0" cap="all" baseline="0">
+                <a:solidFill>
+                  <a:schemeClr val="tx2"/>
+                </a:solidFill>
+              </a:defRPr>
             </a:lvl1pPr>
             <a:lvl2pPr marL="457200" indent="0">
               <a:buNone/>
@@ -1746,13 +1915,7 @@
       </p:sp>
       <p:sp>
         <p:nvSpPr>
-          <p:cNvPr id="6" name="Content Placeholder 5">
-            <a:extLst>
-              <a:ext uri="{FF2B5EF4-FFF2-40B4-BE49-F238E27FC236}">
-                <a16:creationId xmlns:a16="http://schemas.microsoft.com/office/drawing/2014/main" id="{726C0665-906C-40A0-836A-02CE1D7560E7}"/>
-              </a:ext>
-            </a:extLst>
-          </p:cNvPr>
+          <p:cNvPr id="6" name="Content Placeholder 5"/>
           <p:cNvSpPr>
             <a:spLocks noGrp="1"/>
           </p:cNvSpPr>
@@ -1762,8 +1925,8 @@
         </p:nvSpPr>
         <p:spPr>
           <a:xfrm>
-            <a:off x="6172200" y="2505075"/>
-            <a:ext cx="5183188" cy="3684588"/>
+            <a:off x="6217920" y="2582334"/>
+            <a:ext cx="4937760" cy="3378200"/>
           </a:xfrm>
         </p:spPr>
         <p:txBody>
@@ -1803,18 +1966,13 @@
               <a:rPr lang="en-US"/>
               <a:t>Fifth level</a:t>
             </a:r>
-          </a:p>
-        </p:txBody>
-      </p:sp>
-      <p:sp>
-        <p:nvSpPr>
-          <p:cNvPr id="7" name="Date Placeholder 6">
-            <a:extLst>
-              <a:ext uri="{FF2B5EF4-FFF2-40B4-BE49-F238E27FC236}">
-                <a16:creationId xmlns:a16="http://schemas.microsoft.com/office/drawing/2014/main" id="{E1071D83-9852-4E2D-AAA6-47C835604032}"/>
-              </a:ext>
-            </a:extLst>
-          </p:cNvPr>
+            <a:endParaRPr lang="en-US" dirty="0"/>
+          </a:p>
+        </p:txBody>
+      </p:sp>
+      <p:sp>
+        <p:nvSpPr>
+          <p:cNvPr id="7" name="Date Placeholder 6"/>
           <p:cNvSpPr>
             <a:spLocks noGrp="1"/>
           </p:cNvSpPr>
@@ -1837,13 +1995,7 @@
       </p:sp>
       <p:sp>
         <p:nvSpPr>
-          <p:cNvPr id="8" name="Footer Placeholder 7">
-            <a:extLst>
-              <a:ext uri="{FF2B5EF4-FFF2-40B4-BE49-F238E27FC236}">
-                <a16:creationId xmlns:a16="http://schemas.microsoft.com/office/drawing/2014/main" id="{EA676B9F-D70D-4F21-B8C3-EA7E3C4E4CA4}"/>
-              </a:ext>
-            </a:extLst>
-          </p:cNvPr>
+          <p:cNvPr id="8" name="Footer Placeholder 7"/>
           <p:cNvSpPr>
             <a:spLocks noGrp="1"/>
           </p:cNvSpPr>
@@ -1862,13 +2014,7 @@
       </p:sp>
       <p:sp>
         <p:nvSpPr>
-          <p:cNvPr id="9" name="Slide Number Placeholder 8">
-            <a:extLst>
-              <a:ext uri="{FF2B5EF4-FFF2-40B4-BE49-F238E27FC236}">
-                <a16:creationId xmlns:a16="http://schemas.microsoft.com/office/drawing/2014/main" id="{D2AD69A9-6F6E-454A-8C40-DBBFE3B239E7}"/>
-              </a:ext>
-            </a:extLst>
-          </p:cNvPr>
+          <p:cNvPr id="9" name="Slide Number Placeholder 8"/>
           <p:cNvSpPr>
             <a:spLocks noGrp="1"/>
           </p:cNvSpPr>
@@ -1892,7 +2038,7 @@
     </p:spTree>
     <p:extLst>
       <p:ext uri="{BB962C8B-B14F-4D97-AF65-F5344CB8AC3E}">
-        <p14:creationId xmlns:p14="http://schemas.microsoft.com/office/powerpoint/2010/main" val="2033089736"/>
+        <p14:creationId xmlns:p14="http://schemas.microsoft.com/office/powerpoint/2010/main" val="1825063083"/>
       </p:ext>
     </p:extLst>
   </p:cSld>
@@ -1921,13 +2067,7 @@
       </p:grpSpPr>
       <p:sp>
         <p:nvSpPr>
-          <p:cNvPr id="2" name="Title 1">
-            <a:extLst>
-              <a:ext uri="{FF2B5EF4-FFF2-40B4-BE49-F238E27FC236}">
-                <a16:creationId xmlns:a16="http://schemas.microsoft.com/office/drawing/2014/main" id="{D10F11D2-2C23-4A5D-977A-AA2EBA0B5C0C}"/>
-              </a:ext>
-            </a:extLst>
-          </p:cNvPr>
+          <p:cNvPr id="2" name="Title 1"/>
           <p:cNvSpPr>
             <a:spLocks noGrp="1"/>
           </p:cNvSpPr>
@@ -1944,18 +2084,13 @@
               <a:rPr lang="en-US"/>
               <a:t>Click to edit Master title style</a:t>
             </a:r>
-          </a:p>
-        </p:txBody>
-      </p:sp>
-      <p:sp>
-        <p:nvSpPr>
-          <p:cNvPr id="3" name="Date Placeholder 2">
-            <a:extLst>
-              <a:ext uri="{FF2B5EF4-FFF2-40B4-BE49-F238E27FC236}">
-                <a16:creationId xmlns:a16="http://schemas.microsoft.com/office/drawing/2014/main" id="{0775054C-C907-47F9-8CB5-7E0CDB2145BE}"/>
-              </a:ext>
-            </a:extLst>
-          </p:cNvPr>
+            <a:endParaRPr lang="en-US" dirty="0"/>
+          </a:p>
+        </p:txBody>
+      </p:sp>
+      <p:sp>
+        <p:nvSpPr>
+          <p:cNvPr id="3" name="Date Placeholder 2"/>
           <p:cNvSpPr>
             <a:spLocks noGrp="1"/>
           </p:cNvSpPr>
@@ -1978,13 +2113,7 @@
       </p:sp>
       <p:sp>
         <p:nvSpPr>
-          <p:cNvPr id="4" name="Footer Placeholder 3">
-            <a:extLst>
-              <a:ext uri="{FF2B5EF4-FFF2-40B4-BE49-F238E27FC236}">
-                <a16:creationId xmlns:a16="http://schemas.microsoft.com/office/drawing/2014/main" id="{4963F0D6-F1BD-407D-8522-5459150D0EFC}"/>
-              </a:ext>
-            </a:extLst>
-          </p:cNvPr>
+          <p:cNvPr id="4" name="Footer Placeholder 3"/>
           <p:cNvSpPr>
             <a:spLocks noGrp="1"/>
           </p:cNvSpPr>
@@ -2003,13 +2132,7 @@
       </p:sp>
       <p:sp>
         <p:nvSpPr>
-          <p:cNvPr id="5" name="Slide Number Placeholder 4">
-            <a:extLst>
-              <a:ext uri="{FF2B5EF4-FFF2-40B4-BE49-F238E27FC236}">
-                <a16:creationId xmlns:a16="http://schemas.microsoft.com/office/drawing/2014/main" id="{33A24F8B-D7C4-44D4-90FB-0646F8E6B1F2}"/>
-              </a:ext>
-            </a:extLst>
-          </p:cNvPr>
+          <p:cNvPr id="5" name="Slide Number Placeholder 4"/>
           <p:cNvSpPr>
             <a:spLocks noGrp="1"/>
           </p:cNvSpPr>
@@ -2033,7 +2156,7 @@
     </p:spTree>
     <p:extLst>
       <p:ext uri="{BB962C8B-B14F-4D97-AF65-F5344CB8AC3E}">
-        <p14:creationId xmlns:p14="http://schemas.microsoft.com/office/powerpoint/2010/main" val="3887656573"/>
+        <p14:creationId xmlns:p14="http://schemas.microsoft.com/office/powerpoint/2010/main" val="1609333456"/>
       </p:ext>
     </p:extLst>
   </p:cSld>
@@ -2044,7 +2167,7 @@
 </file>
 
 <file path=ppt/slideLayouts/slideLayout7.xml><?xml version="1.0" encoding="utf-8"?>
-<p:sldLayout xmlns:a="http://schemas.openxmlformats.org/drawingml/2006/main" xmlns:r="http://schemas.openxmlformats.org/officeDocument/2006/relationships" xmlns:p="http://schemas.openxmlformats.org/presentationml/2006/main" type="blank" preserve="1">
+<p:sldLayout xmlns:a="http://schemas.openxmlformats.org/drawingml/2006/main" xmlns:r="http://schemas.openxmlformats.org/officeDocument/2006/relationships" xmlns:p="http://schemas.openxmlformats.org/presentationml/2006/main" showMasterSp="0" type="blank" preserve="1">
   <p:cSld name="Blank">
     <p:spTree>
       <p:nvGrpSpPr>
@@ -2062,13 +2185,83 @@
       </p:grpSpPr>
       <p:sp>
         <p:nvSpPr>
-          <p:cNvPr id="2" name="Date Placeholder 1">
-            <a:extLst>
-              <a:ext uri="{FF2B5EF4-FFF2-40B4-BE49-F238E27FC236}">
-                <a16:creationId xmlns:a16="http://schemas.microsoft.com/office/drawing/2014/main" id="{E3E74A75-8BCA-4829-8AF7-6EF62513CB11}"/>
-              </a:ext>
-            </a:extLst>
-          </p:cNvPr>
+          <p:cNvPr id="5" name="Rectangle 4"/>
+          <p:cNvSpPr/>
+          <p:nvPr/>
+        </p:nvSpPr>
+        <p:spPr>
+          <a:xfrm>
+            <a:off x="3175" y="6400800"/>
+            <a:ext cx="12188825" cy="457200"/>
+          </a:xfrm>
+          <a:prstGeom prst="rect">
+            <a:avLst/>
+          </a:prstGeom>
+          <a:solidFill>
+            <a:schemeClr val="accent2"/>
+          </a:solidFill>
+          <a:ln>
+            <a:noFill/>
+          </a:ln>
+        </p:spPr>
+        <p:style>
+          <a:lnRef idx="2">
+            <a:schemeClr val="accent1">
+              <a:shade val="50000"/>
+            </a:schemeClr>
+          </a:lnRef>
+          <a:fillRef idx="1">
+            <a:schemeClr val="accent1"/>
+          </a:fillRef>
+          <a:effectRef idx="0">
+            <a:schemeClr val="accent1"/>
+          </a:effectRef>
+          <a:fontRef idx="minor">
+            <a:schemeClr val="lt1"/>
+          </a:fontRef>
+        </p:style>
+      </p:sp>
+      <p:sp>
+        <p:nvSpPr>
+          <p:cNvPr id="6" name="Rectangle 5"/>
+          <p:cNvSpPr/>
+          <p:nvPr/>
+        </p:nvSpPr>
+        <p:spPr>
+          <a:xfrm>
+            <a:off x="15" y="6334316"/>
+            <a:ext cx="12188825" cy="64008"/>
+          </a:xfrm>
+          <a:prstGeom prst="rect">
+            <a:avLst/>
+          </a:prstGeom>
+          <a:solidFill>
+            <a:schemeClr val="accent1"/>
+          </a:solidFill>
+          <a:ln>
+            <a:noFill/>
+          </a:ln>
+        </p:spPr>
+        <p:style>
+          <a:lnRef idx="2">
+            <a:schemeClr val="accent1">
+              <a:shade val="50000"/>
+            </a:schemeClr>
+          </a:lnRef>
+          <a:fillRef idx="1">
+            <a:schemeClr val="accent1"/>
+          </a:fillRef>
+          <a:effectRef idx="0">
+            <a:schemeClr val="accent1"/>
+          </a:effectRef>
+          <a:fontRef idx="minor">
+            <a:schemeClr val="lt1"/>
+          </a:fontRef>
+        </p:style>
+      </p:sp>
+      <p:sp>
+        <p:nvSpPr>
+          <p:cNvPr id="7" name="Date Placeholder 6"/>
           <p:cNvSpPr>
             <a:spLocks noGrp="1"/>
           </p:cNvSpPr>
@@ -2091,13 +2284,7 @@
       </p:sp>
       <p:sp>
         <p:nvSpPr>
-          <p:cNvPr id="3" name="Footer Placeholder 2">
-            <a:extLst>
-              <a:ext uri="{FF2B5EF4-FFF2-40B4-BE49-F238E27FC236}">
-                <a16:creationId xmlns:a16="http://schemas.microsoft.com/office/drawing/2014/main" id="{347D117A-AE8D-4F6C-84D7-44B8F9CD485C}"/>
-              </a:ext>
-            </a:extLst>
-          </p:cNvPr>
+          <p:cNvPr id="8" name="Footer Placeholder 7"/>
           <p:cNvSpPr>
             <a:spLocks noGrp="1"/>
           </p:cNvSpPr>
@@ -2108,7 +2295,15 @@
         <p:spPr/>
         <p:txBody>
           <a:bodyPr/>
-          <a:lstStyle/>
+          <a:lstStyle>
+            <a:lvl1pPr>
+              <a:defRPr>
+                <a:solidFill>
+                  <a:srgbClr val="FFFFFF"/>
+                </a:solidFill>
+              </a:defRPr>
+            </a:lvl1pPr>
+          </a:lstStyle>
           <a:p>
             <a:endParaRPr lang="en-US"/>
           </a:p>
@@ -2116,13 +2311,7 @@
       </p:sp>
       <p:sp>
         <p:nvSpPr>
-          <p:cNvPr id="4" name="Slide Number Placeholder 3">
-            <a:extLst>
-              <a:ext uri="{FF2B5EF4-FFF2-40B4-BE49-F238E27FC236}">
-                <a16:creationId xmlns:a16="http://schemas.microsoft.com/office/drawing/2014/main" id="{9FE5056D-5479-4FE8-B29F-206D6D75ABF4}"/>
-              </a:ext>
-            </a:extLst>
-          </p:cNvPr>
+          <p:cNvPr id="9" name="Slide Number Placeholder 8"/>
           <p:cNvSpPr>
             <a:spLocks noGrp="1"/>
           </p:cNvSpPr>
@@ -2146,7 +2335,7 @@
     </p:spTree>
     <p:extLst>
       <p:ext uri="{BB962C8B-B14F-4D97-AF65-F5344CB8AC3E}">
-        <p14:creationId xmlns:p14="http://schemas.microsoft.com/office/powerpoint/2010/main" val="2486807999"/>
+        <p14:creationId xmlns:p14="http://schemas.microsoft.com/office/powerpoint/2010/main" val="2384725914"/>
       </p:ext>
     </p:extLst>
   </p:cSld>
@@ -2157,7 +2346,7 @@
 </file>
 
 <file path=ppt/slideLayouts/slideLayout8.xml><?xml version="1.0" encoding="utf-8"?>
-<p:sldLayout xmlns:a="http://schemas.openxmlformats.org/drawingml/2006/main" xmlns:r="http://schemas.openxmlformats.org/officeDocument/2006/relationships" xmlns:p="http://schemas.openxmlformats.org/presentationml/2006/main" type="objTx" preserve="1">
+<p:sldLayout xmlns:a="http://schemas.openxmlformats.org/drawingml/2006/main" xmlns:r="http://schemas.openxmlformats.org/officeDocument/2006/relationships" xmlns:p="http://schemas.openxmlformats.org/presentationml/2006/main" showMasterSp="0" type="objTx" preserve="1">
   <p:cSld name="Content with Caption">
     <p:spTree>
       <p:nvGrpSpPr>
@@ -2175,31 +2364,107 @@
       </p:grpSpPr>
       <p:sp>
         <p:nvSpPr>
-          <p:cNvPr id="2" name="Title 1">
-            <a:extLst>
-              <a:ext uri="{FF2B5EF4-FFF2-40B4-BE49-F238E27FC236}">
-                <a16:creationId xmlns:a16="http://schemas.microsoft.com/office/drawing/2014/main" id="{540C3FC6-3F7A-4181-9A28-B7593401BE2B}"/>
-              </a:ext>
-            </a:extLst>
-          </p:cNvPr>
-          <p:cNvSpPr>
-            <a:spLocks noGrp="1"/>
-          </p:cNvSpPr>
-          <p:nvPr>
-            <p:ph type="title"/>
-          </p:nvPr>
+          <p:cNvPr id="8" name="Rectangle 7"/>
+          <p:cNvSpPr/>
+          <p:nvPr/>
         </p:nvSpPr>
         <p:spPr>
           <a:xfrm>
-            <a:off x="839788" y="457200"/>
-            <a:ext cx="3932237" cy="1600200"/>
+            <a:off x="16" y="0"/>
+            <a:ext cx="4050791" cy="6858000"/>
+          </a:xfrm>
+          <a:prstGeom prst="rect">
+            <a:avLst/>
+          </a:prstGeom>
+          <a:solidFill>
+            <a:schemeClr val="accent2"/>
+          </a:solidFill>
+          <a:ln>
+            <a:noFill/>
+          </a:ln>
+        </p:spPr>
+        <p:style>
+          <a:lnRef idx="2">
+            <a:schemeClr val="accent1">
+              <a:shade val="50000"/>
+            </a:schemeClr>
+          </a:lnRef>
+          <a:fillRef idx="1">
+            <a:schemeClr val="accent1"/>
+          </a:fillRef>
+          <a:effectRef idx="0">
+            <a:schemeClr val="accent1"/>
+          </a:effectRef>
+          <a:fontRef idx="minor">
+            <a:schemeClr val="lt1"/>
+          </a:fontRef>
+        </p:style>
+      </p:sp>
+      <p:sp>
+        <p:nvSpPr>
+          <p:cNvPr id="9" name="Rectangle 8"/>
+          <p:cNvSpPr/>
+          <p:nvPr/>
+        </p:nvSpPr>
+        <p:spPr>
+          <a:xfrm>
+            <a:off x="4040071" y="0"/>
+            <a:ext cx="64008" cy="6858000"/>
+          </a:xfrm>
+          <a:prstGeom prst="rect">
+            <a:avLst/>
+          </a:prstGeom>
+          <a:solidFill>
+            <a:schemeClr val="accent1"/>
+          </a:solidFill>
+          <a:ln>
+            <a:noFill/>
+          </a:ln>
+        </p:spPr>
+        <p:style>
+          <a:lnRef idx="2">
+            <a:schemeClr val="accent1">
+              <a:shade val="50000"/>
+            </a:schemeClr>
+          </a:lnRef>
+          <a:fillRef idx="1">
+            <a:schemeClr val="accent1"/>
+          </a:fillRef>
+          <a:effectRef idx="0">
+            <a:schemeClr val="accent1"/>
+          </a:effectRef>
+          <a:fontRef idx="minor">
+            <a:schemeClr val="lt1"/>
+          </a:fontRef>
+        </p:style>
+      </p:sp>
+      <p:sp>
+        <p:nvSpPr>
+          <p:cNvPr id="2" name="Title 1"/>
+          <p:cNvSpPr>
+            <a:spLocks noGrp="1"/>
+          </p:cNvSpPr>
+          <p:nvPr>
+            <p:ph type="title"/>
+          </p:nvPr>
+        </p:nvSpPr>
+        <p:spPr>
+          <a:xfrm>
+            <a:off x="457200" y="594359"/>
+            <a:ext cx="3200400" cy="2286000"/>
           </a:xfrm>
         </p:spPr>
         <p:txBody>
-          <a:bodyPr anchor="b"/>
+          <a:bodyPr anchor="b">
+            <a:normAutofit/>
+          </a:bodyPr>
           <a:lstStyle>
             <a:lvl1pPr>
-              <a:defRPr sz="3200"/>
+              <a:defRPr sz="3600" b="0">
+                <a:solidFill>
+                  <a:srgbClr val="FFFFFF"/>
+                </a:solidFill>
+              </a:defRPr>
             </a:lvl1pPr>
           </a:lstStyle>
           <a:p>
@@ -2207,18 +2472,13 @@
               <a:rPr lang="en-US"/>
               <a:t>Click to edit Master title style</a:t>
             </a:r>
-          </a:p>
-        </p:txBody>
-      </p:sp>
-      <p:sp>
-        <p:nvSpPr>
-          <p:cNvPr id="3" name="Content Placeholder 2">
-            <a:extLst>
-              <a:ext uri="{FF2B5EF4-FFF2-40B4-BE49-F238E27FC236}">
-                <a16:creationId xmlns:a16="http://schemas.microsoft.com/office/drawing/2014/main" id="{0B0871C7-4C5F-4B53-A539-8CFA27B5835A}"/>
-              </a:ext>
-            </a:extLst>
-          </p:cNvPr>
+            <a:endParaRPr lang="en-US" dirty="0"/>
+          </a:p>
+        </p:txBody>
+      </p:sp>
+      <p:sp>
+        <p:nvSpPr>
+          <p:cNvPr id="3" name="Content Placeholder 2"/>
           <p:cNvSpPr>
             <a:spLocks noGrp="1"/>
           </p:cNvSpPr>
@@ -2228,41 +2488,13 @@
         </p:nvSpPr>
         <p:spPr>
           <a:xfrm>
-            <a:off x="5183188" y="987425"/>
-            <a:ext cx="6172200" cy="4873625"/>
+            <a:off x="4800600" y="731520"/>
+            <a:ext cx="6492240" cy="5257800"/>
           </a:xfrm>
         </p:spPr>
         <p:txBody>
           <a:bodyPr/>
-          <a:lstStyle>
-            <a:lvl1pPr>
-              <a:defRPr sz="3200"/>
-            </a:lvl1pPr>
-            <a:lvl2pPr>
-              <a:defRPr sz="2800"/>
-            </a:lvl2pPr>
-            <a:lvl3pPr>
-              <a:defRPr sz="2400"/>
-            </a:lvl3pPr>
-            <a:lvl4pPr>
-              <a:defRPr sz="2000"/>
-            </a:lvl4pPr>
-            <a:lvl5pPr>
-              <a:defRPr sz="2000"/>
-            </a:lvl5pPr>
-            <a:lvl6pPr>
-              <a:defRPr sz="2000"/>
-            </a:lvl6pPr>
-            <a:lvl7pPr>
-              <a:defRPr sz="2000"/>
-            </a:lvl7pPr>
-            <a:lvl8pPr>
-              <a:defRPr sz="2000"/>
-            </a:lvl8pPr>
-            <a:lvl9pPr>
-              <a:defRPr sz="2000"/>
-            </a:lvl9pPr>
-          </a:lstStyle>
+          <a:lstStyle/>
           <a:p>
             <a:pPr lvl="0"/>
             <a:r>
@@ -2297,18 +2529,13 @@
               <a:rPr lang="en-US"/>
               <a:t>Fifth level</a:t>
             </a:r>
-          </a:p>
-        </p:txBody>
-      </p:sp>
-      <p:sp>
-        <p:nvSpPr>
-          <p:cNvPr id="4" name="Text Placeholder 3">
-            <a:extLst>
-              <a:ext uri="{FF2B5EF4-FFF2-40B4-BE49-F238E27FC236}">
-                <a16:creationId xmlns:a16="http://schemas.microsoft.com/office/drawing/2014/main" id="{D6FB99E3-7FE3-4452-BD72-56AFB55FD389}"/>
-              </a:ext>
-            </a:extLst>
-          </p:cNvPr>
+            <a:endParaRPr lang="en-US" dirty="0"/>
+          </a:p>
+        </p:txBody>
+      </p:sp>
+      <p:sp>
+        <p:nvSpPr>
+          <p:cNvPr id="4" name="Text Placeholder 3"/>
           <p:cNvSpPr>
             <a:spLocks noGrp="1"/>
           </p:cNvSpPr>
@@ -2318,48 +2545,54 @@
         </p:nvSpPr>
         <p:spPr>
           <a:xfrm>
-            <a:off x="839788" y="2057400"/>
-            <a:ext cx="3932237" cy="3811588"/>
+            <a:off x="457200" y="2926080"/>
+            <a:ext cx="3200400" cy="3379124"/>
           </a:xfrm>
         </p:spPr>
         <p:txBody>
-          <a:bodyPr/>
+          <a:bodyPr lIns="91440" rIns="91440">
+            <a:normAutofit/>
+          </a:bodyPr>
           <a:lstStyle>
             <a:lvl1pPr marL="0" indent="0">
               <a:buNone/>
-              <a:defRPr sz="1600"/>
+              <a:defRPr sz="1500">
+                <a:solidFill>
+                  <a:srgbClr val="FFFFFF"/>
+                </a:solidFill>
+              </a:defRPr>
             </a:lvl1pPr>
             <a:lvl2pPr marL="457200" indent="0">
               <a:buNone/>
-              <a:defRPr sz="1400"/>
+              <a:defRPr sz="1200"/>
             </a:lvl2pPr>
             <a:lvl3pPr marL="914400" indent="0">
               <a:buNone/>
-              <a:defRPr sz="1200"/>
+              <a:defRPr sz="1000"/>
             </a:lvl3pPr>
             <a:lvl4pPr marL="1371600" indent="0">
               <a:buNone/>
-              <a:defRPr sz="1000"/>
+              <a:defRPr sz="900"/>
             </a:lvl4pPr>
             <a:lvl5pPr marL="1828800" indent="0">
               <a:buNone/>
-              <a:defRPr sz="1000"/>
+              <a:defRPr sz="900"/>
             </a:lvl5pPr>
             <a:lvl6pPr marL="2286000" indent="0">
               <a:buNone/>
-              <a:defRPr sz="1000"/>
+              <a:defRPr sz="900"/>
             </a:lvl6pPr>
             <a:lvl7pPr marL="2743200" indent="0">
               <a:buNone/>
-              <a:defRPr sz="1000"/>
+              <a:defRPr sz="900"/>
             </a:lvl7pPr>
             <a:lvl8pPr marL="3200400" indent="0">
               <a:buNone/>
-              <a:defRPr sz="1000"/>
+              <a:defRPr sz="900"/>
             </a:lvl8pPr>
             <a:lvl9pPr marL="3657600" indent="0">
               <a:buNone/>
-              <a:defRPr sz="1000"/>
+              <a:defRPr sz="900"/>
             </a:lvl9pPr>
           </a:lstStyle>
           <a:p>
@@ -2373,13 +2606,7 @@
       </p:sp>
       <p:sp>
         <p:nvSpPr>
-          <p:cNvPr id="5" name="Date Placeholder 4">
-            <a:extLst>
-              <a:ext uri="{FF2B5EF4-FFF2-40B4-BE49-F238E27FC236}">
-                <a16:creationId xmlns:a16="http://schemas.microsoft.com/office/drawing/2014/main" id="{7EB26A10-0AE3-4D5E-8CEF-E588746C5B64}"/>
-              </a:ext>
-            </a:extLst>
-          </p:cNvPr>
+          <p:cNvPr id="5" name="Date Placeholder 4"/>
           <p:cNvSpPr>
             <a:spLocks noGrp="1"/>
           </p:cNvSpPr>
@@ -2387,10 +2614,19 @@
             <p:ph type="dt" sz="half" idx="10"/>
           </p:nvPr>
         </p:nvSpPr>
-        <p:spPr/>
+        <p:spPr>
+          <a:xfrm>
+            <a:off x="465512" y="6459785"/>
+            <a:ext cx="2618510" cy="365125"/>
+          </a:xfrm>
+        </p:spPr>
         <p:txBody>
           <a:bodyPr/>
-          <a:lstStyle/>
+          <a:lstStyle>
+            <a:lvl1pPr algn="l">
+              <a:defRPr/>
+            </a:lvl1pPr>
+          </a:lstStyle>
           <a:p>
             <a:fld id="{35B57CEC-9615-4DC7-B897-9CFA111714B0}" type="datetimeFigureOut">
               <a:rPr lang="en-US" smtClean="0"/>
@@ -2402,13 +2638,7 @@
       </p:sp>
       <p:sp>
         <p:nvSpPr>
-          <p:cNvPr id="6" name="Footer Placeholder 5">
-            <a:extLst>
-              <a:ext uri="{FF2B5EF4-FFF2-40B4-BE49-F238E27FC236}">
-                <a16:creationId xmlns:a16="http://schemas.microsoft.com/office/drawing/2014/main" id="{8144B12D-C823-4EDB-ABFF-830C3E24B179}"/>
-              </a:ext>
-            </a:extLst>
-          </p:cNvPr>
+          <p:cNvPr id="6" name="Footer Placeholder 5"/>
           <p:cNvSpPr>
             <a:spLocks noGrp="1"/>
           </p:cNvSpPr>
@@ -2416,35 +2646,50 @@
             <p:ph type="ftr" sz="quarter" idx="11"/>
           </p:nvPr>
         </p:nvSpPr>
+        <p:spPr>
+          <a:xfrm>
+            <a:off x="4800600" y="6459785"/>
+            <a:ext cx="4648200" cy="365125"/>
+          </a:xfrm>
+        </p:spPr>
+        <p:txBody>
+          <a:bodyPr/>
+          <a:lstStyle>
+            <a:lvl1pPr algn="l">
+              <a:defRPr>
+                <a:solidFill>
+                  <a:schemeClr val="tx2"/>
+                </a:solidFill>
+              </a:defRPr>
+            </a:lvl1pPr>
+          </a:lstStyle>
+          <a:p>
+            <a:endParaRPr lang="en-US"/>
+          </a:p>
+        </p:txBody>
+      </p:sp>
+      <p:sp>
+        <p:nvSpPr>
+          <p:cNvPr id="7" name="Slide Number Placeholder 6"/>
+          <p:cNvSpPr>
+            <a:spLocks noGrp="1"/>
+          </p:cNvSpPr>
+          <p:nvPr>
+            <p:ph type="sldNum" sz="quarter" idx="12"/>
+          </p:nvPr>
+        </p:nvSpPr>
         <p:spPr/>
         <p:txBody>
           <a:bodyPr/>
-          <a:lstStyle/>
-          <a:p>
-            <a:endParaRPr lang="en-US"/>
-          </a:p>
-        </p:txBody>
-      </p:sp>
-      <p:sp>
-        <p:nvSpPr>
-          <p:cNvPr id="7" name="Slide Number Placeholder 6">
-            <a:extLst>
-              <a:ext uri="{FF2B5EF4-FFF2-40B4-BE49-F238E27FC236}">
-                <a16:creationId xmlns:a16="http://schemas.microsoft.com/office/drawing/2014/main" id="{3C67DE74-3CED-4A28-9E3E-C7DADAC3ACBA}"/>
-              </a:ext>
-            </a:extLst>
-          </p:cNvPr>
-          <p:cNvSpPr>
-            <a:spLocks noGrp="1"/>
-          </p:cNvSpPr>
-          <p:nvPr>
-            <p:ph type="sldNum" sz="quarter" idx="12"/>
-          </p:nvPr>
-        </p:nvSpPr>
-        <p:spPr/>
-        <p:txBody>
-          <a:bodyPr/>
-          <a:lstStyle/>
+          <a:lstStyle>
+            <a:lvl1pPr>
+              <a:defRPr>
+                <a:solidFill>
+                  <a:schemeClr val="tx2"/>
+                </a:solidFill>
+              </a:defRPr>
+            </a:lvl1pPr>
+          </a:lstStyle>
           <a:p>
             <a:fld id="{2936347C-5ED2-4E30-AE59-780C2B4ADBFB}" type="slidenum">
               <a:rPr lang="en-US" smtClean="0"/>
@@ -2457,7 +2702,7 @@
     </p:spTree>
     <p:extLst>
       <p:ext uri="{BB962C8B-B14F-4D97-AF65-F5344CB8AC3E}">
-        <p14:creationId xmlns:p14="http://schemas.microsoft.com/office/powerpoint/2010/main" val="3481310880"/>
+        <p14:creationId xmlns:p14="http://schemas.microsoft.com/office/powerpoint/2010/main" val="2136049886"/>
       </p:ext>
     </p:extLst>
   </p:cSld>
@@ -2468,7 +2713,7 @@
 </file>
 
 <file path=ppt/slideLayouts/slideLayout9.xml><?xml version="1.0" encoding="utf-8"?>
-<p:sldLayout xmlns:a="http://schemas.openxmlformats.org/drawingml/2006/main" xmlns:r="http://schemas.openxmlformats.org/officeDocument/2006/relationships" xmlns:p="http://schemas.openxmlformats.org/presentationml/2006/main" type="picTx" preserve="1">
+<p:sldLayout xmlns:a="http://schemas.openxmlformats.org/drawingml/2006/main" xmlns:r="http://schemas.openxmlformats.org/officeDocument/2006/relationships" xmlns:p="http://schemas.openxmlformats.org/presentationml/2006/main" showMasterSp="0" type="picTx" preserve="1">
   <p:cSld name="Picture with Caption">
     <p:spTree>
       <p:nvGrpSpPr>
@@ -2486,31 +2731,107 @@
       </p:grpSpPr>
       <p:sp>
         <p:nvSpPr>
-          <p:cNvPr id="2" name="Title 1">
-            <a:extLst>
-              <a:ext uri="{FF2B5EF4-FFF2-40B4-BE49-F238E27FC236}">
-                <a16:creationId xmlns:a16="http://schemas.microsoft.com/office/drawing/2014/main" id="{5FD8CB4D-DF3C-4DDB-867F-A7B2D6B63638}"/>
-              </a:ext>
-            </a:extLst>
-          </p:cNvPr>
-          <p:cNvSpPr>
-            <a:spLocks noGrp="1"/>
-          </p:cNvSpPr>
-          <p:nvPr>
-            <p:ph type="title"/>
-          </p:nvPr>
+          <p:cNvPr id="8" name="Rectangle 7"/>
+          <p:cNvSpPr/>
+          <p:nvPr/>
         </p:nvSpPr>
         <p:spPr>
           <a:xfrm>
-            <a:off x="839788" y="457200"/>
-            <a:ext cx="3932237" cy="1600200"/>
+            <a:off x="0" y="4953000"/>
+            <a:ext cx="12188825" cy="1905000"/>
+          </a:xfrm>
+          <a:prstGeom prst="rect">
+            <a:avLst/>
+          </a:prstGeom>
+          <a:solidFill>
+            <a:schemeClr val="accent2"/>
+          </a:solidFill>
+          <a:ln>
+            <a:noFill/>
+          </a:ln>
+        </p:spPr>
+        <p:style>
+          <a:lnRef idx="2">
+            <a:schemeClr val="accent1">
+              <a:shade val="50000"/>
+            </a:schemeClr>
+          </a:lnRef>
+          <a:fillRef idx="1">
+            <a:schemeClr val="accent1"/>
+          </a:fillRef>
+          <a:effectRef idx="0">
+            <a:schemeClr val="accent1"/>
+          </a:effectRef>
+          <a:fontRef idx="minor">
+            <a:schemeClr val="lt1"/>
+          </a:fontRef>
+        </p:style>
+      </p:sp>
+      <p:sp>
+        <p:nvSpPr>
+          <p:cNvPr id="9" name="Rectangle 8"/>
+          <p:cNvSpPr/>
+          <p:nvPr/>
+        </p:nvSpPr>
+        <p:spPr>
+          <a:xfrm>
+            <a:off x="15" y="4915076"/>
+            <a:ext cx="12188825" cy="64008"/>
+          </a:xfrm>
+          <a:prstGeom prst="rect">
+            <a:avLst/>
+          </a:prstGeom>
+          <a:solidFill>
+            <a:schemeClr val="accent1"/>
+          </a:solidFill>
+          <a:ln>
+            <a:noFill/>
+          </a:ln>
+        </p:spPr>
+        <p:style>
+          <a:lnRef idx="2">
+            <a:schemeClr val="accent1">
+              <a:shade val="50000"/>
+            </a:schemeClr>
+          </a:lnRef>
+          <a:fillRef idx="1">
+            <a:schemeClr val="accent1"/>
+          </a:fillRef>
+          <a:effectRef idx="0">
+            <a:schemeClr val="accent1"/>
+          </a:effectRef>
+          <a:fontRef idx="minor">
+            <a:schemeClr val="lt1"/>
+          </a:fontRef>
+        </p:style>
+      </p:sp>
+      <p:sp>
+        <p:nvSpPr>
+          <p:cNvPr id="2" name="Title 1"/>
+          <p:cNvSpPr>
+            <a:spLocks noGrp="1"/>
+          </p:cNvSpPr>
+          <p:nvPr>
+            <p:ph type="title"/>
+          </p:nvPr>
+        </p:nvSpPr>
+        <p:spPr>
+          <a:xfrm>
+            <a:off x="1097280" y="5074920"/>
+            <a:ext cx="10113264" cy="822960"/>
           </a:xfrm>
         </p:spPr>
         <p:txBody>
-          <a:bodyPr anchor="b"/>
+          <a:bodyPr lIns="91440" tIns="0" rIns="91440" bIns="0" anchor="b">
+            <a:noAutofit/>
+          </a:bodyPr>
           <a:lstStyle>
             <a:lvl1pPr>
-              <a:defRPr sz="3200"/>
+              <a:defRPr sz="3600" b="0">
+                <a:solidFill>
+                  <a:srgbClr val="FFFFFF"/>
+                </a:solidFill>
+              </a:defRPr>
             </a:lvl1pPr>
           </a:lstStyle>
           <a:p>
@@ -2518,20 +2839,15 @@
               <a:rPr lang="en-US"/>
               <a:t>Click to edit Master title style</a:t>
             </a:r>
-          </a:p>
-        </p:txBody>
-      </p:sp>
-      <p:sp>
-        <p:nvSpPr>
-          <p:cNvPr id="3" name="Picture Placeholder 2">
-            <a:extLst>
-              <a:ext uri="{FF2B5EF4-FFF2-40B4-BE49-F238E27FC236}">
-                <a16:creationId xmlns:a16="http://schemas.microsoft.com/office/drawing/2014/main" id="{4D7821ED-B32B-4E6A-BDE8-86E4896901BC}"/>
-              </a:ext>
-            </a:extLst>
-          </p:cNvPr>
-          <p:cNvSpPr>
-            <a:spLocks noGrp="1"/>
+            <a:endParaRPr lang="en-US" dirty="0"/>
+          </a:p>
+        </p:txBody>
+      </p:sp>
+      <p:sp>
+        <p:nvSpPr>
+          <p:cNvPr id="3" name="Picture Placeholder 2"/>
+          <p:cNvSpPr>
+            <a:spLocks noGrp="1" noChangeAspect="1"/>
           </p:cNvSpPr>
           <p:nvPr>
             <p:ph type="pic" idx="1"/>
@@ -2539,16 +2855,26 @@
         </p:nvSpPr>
         <p:spPr>
           <a:xfrm>
-            <a:off x="5183188" y="987425"/>
-            <a:ext cx="6172200" cy="4873625"/>
+            <a:off x="15" y="0"/>
+            <a:ext cx="12191985" cy="4915076"/>
           </a:xfrm>
+          <a:blipFill>
+            <a:blip r:embed="rId2"/>
+            <a:stretch>
+              <a:fillRect/>
+            </a:stretch>
+          </a:blipFill>
         </p:spPr>
         <p:txBody>
-          <a:bodyPr/>
+          <a:bodyPr lIns="457200" tIns="457200" anchor="t"/>
           <a:lstStyle>
             <a:lvl1pPr marL="0" indent="0">
               <a:buNone/>
-              <a:defRPr sz="3200"/>
+              <a:defRPr sz="3200">
+                <a:solidFill>
+                  <a:schemeClr val="bg1"/>
+                </a:solidFill>
+              </a:defRPr>
             </a:lvl1pPr>
             <a:lvl2pPr marL="457200" indent="0">
               <a:buNone/>
@@ -2584,19 +2910,17 @@
             </a:lvl9pPr>
           </a:lstStyle>
           <a:p>
-            <a:endParaRPr lang="en-US"/>
-          </a:p>
-        </p:txBody>
-      </p:sp>
-      <p:sp>
-        <p:nvSpPr>
-          <p:cNvPr id="4" name="Text Placeholder 3">
-            <a:extLst>
-              <a:ext uri="{FF2B5EF4-FFF2-40B4-BE49-F238E27FC236}">
-                <a16:creationId xmlns:a16="http://schemas.microsoft.com/office/drawing/2014/main" id="{68204497-328C-44E6-8B65-A69018E79B5A}"/>
-              </a:ext>
-            </a:extLst>
-          </p:cNvPr>
+            <a:r>
+              <a:rPr lang="en-US"/>
+              <a:t>Click icon to add picture</a:t>
+            </a:r>
+            <a:endParaRPr lang="en-US" dirty="0"/>
+          </a:p>
+        </p:txBody>
+      </p:sp>
+      <p:sp>
+        <p:nvSpPr>
+          <p:cNvPr id="4" name="Text Placeholder 3"/>
           <p:cNvSpPr>
             <a:spLocks noGrp="1"/>
           </p:cNvSpPr>
@@ -2606,48 +2930,60 @@
         </p:nvSpPr>
         <p:spPr>
           <a:xfrm>
-            <a:off x="839788" y="2057400"/>
-            <a:ext cx="3932237" cy="3811588"/>
+            <a:off x="1097280" y="5907023"/>
+            <a:ext cx="10113264" cy="594360"/>
           </a:xfrm>
         </p:spPr>
         <p:txBody>
-          <a:bodyPr/>
+          <a:bodyPr lIns="91440" tIns="0" rIns="91440" bIns="0">
+            <a:normAutofit/>
+          </a:bodyPr>
           <a:lstStyle>
             <a:lvl1pPr marL="0" indent="0">
+              <a:spcBef>
+                <a:spcPts val="0"/>
+              </a:spcBef>
+              <a:spcAft>
+                <a:spcPts val="600"/>
+              </a:spcAft>
               <a:buNone/>
-              <a:defRPr sz="1600"/>
+              <a:defRPr sz="1500">
+                <a:solidFill>
+                  <a:srgbClr val="FFFFFF"/>
+                </a:solidFill>
+              </a:defRPr>
             </a:lvl1pPr>
             <a:lvl2pPr marL="457200" indent="0">
               <a:buNone/>
-              <a:defRPr sz="1400"/>
+              <a:defRPr sz="1200"/>
             </a:lvl2pPr>
             <a:lvl3pPr marL="914400" indent="0">
               <a:buNone/>
-              <a:defRPr sz="1200"/>
+              <a:defRPr sz="1000"/>
             </a:lvl3pPr>
             <a:lvl4pPr marL="1371600" indent="0">
               <a:buNone/>
-              <a:defRPr sz="1000"/>
+              <a:defRPr sz="900"/>
             </a:lvl4pPr>
             <a:lvl5pPr marL="1828800" indent="0">
               <a:buNone/>
-              <a:defRPr sz="1000"/>
+              <a:defRPr sz="900"/>
             </a:lvl5pPr>
             <a:lvl6pPr marL="2286000" indent="0">
               <a:buNone/>
-              <a:defRPr sz="1000"/>
+              <a:defRPr sz="900"/>
             </a:lvl6pPr>
             <a:lvl7pPr marL="2743200" indent="0">
               <a:buNone/>
-              <a:defRPr sz="1000"/>
+              <a:defRPr sz="900"/>
             </a:lvl7pPr>
             <a:lvl8pPr marL="3200400" indent="0">
               <a:buNone/>
-              <a:defRPr sz="1000"/>
+              <a:defRPr sz="900"/>
             </a:lvl8pPr>
             <a:lvl9pPr marL="3657600" indent="0">
               <a:buNone/>
-              <a:defRPr sz="1000"/>
+              <a:defRPr sz="900"/>
             </a:lvl9pPr>
           </a:lstStyle>
           <a:p>
@@ -2661,13 +2997,7 @@
       </p:sp>
       <p:sp>
         <p:nvSpPr>
-          <p:cNvPr id="5" name="Date Placeholder 4">
-            <a:extLst>
-              <a:ext uri="{FF2B5EF4-FFF2-40B4-BE49-F238E27FC236}">
-                <a16:creationId xmlns:a16="http://schemas.microsoft.com/office/drawing/2014/main" id="{90CF8F3E-DDF7-4C19-8AD7-9D003E7EC004}"/>
-              </a:ext>
-            </a:extLst>
-          </p:cNvPr>
+          <p:cNvPr id="5" name="Date Placeholder 4"/>
           <p:cNvSpPr>
             <a:spLocks noGrp="1"/>
           </p:cNvSpPr>
@@ -2690,13 +3020,7 @@
       </p:sp>
       <p:sp>
         <p:nvSpPr>
-          <p:cNvPr id="6" name="Footer Placeholder 5">
-            <a:extLst>
-              <a:ext uri="{FF2B5EF4-FFF2-40B4-BE49-F238E27FC236}">
-                <a16:creationId xmlns:a16="http://schemas.microsoft.com/office/drawing/2014/main" id="{74F94DC5-BAB5-4799-8A74-4C5E50000C22}"/>
-              </a:ext>
-            </a:extLst>
-          </p:cNvPr>
+          <p:cNvPr id="6" name="Footer Placeholder 5"/>
           <p:cNvSpPr>
             <a:spLocks noGrp="1"/>
           </p:cNvSpPr>
@@ -2715,13 +3039,7 @@
       </p:sp>
       <p:sp>
         <p:nvSpPr>
-          <p:cNvPr id="7" name="Slide Number Placeholder 6">
-            <a:extLst>
-              <a:ext uri="{FF2B5EF4-FFF2-40B4-BE49-F238E27FC236}">
-                <a16:creationId xmlns:a16="http://schemas.microsoft.com/office/drawing/2014/main" id="{11068B33-F8CA-4029-AE7F-E9DDFB67B5BA}"/>
-              </a:ext>
-            </a:extLst>
-          </p:cNvPr>
+          <p:cNvPr id="7" name="Slide Number Placeholder 6"/>
           <p:cNvSpPr>
             <a:spLocks noGrp="1"/>
           </p:cNvSpPr>
@@ -2745,7 +3063,7 @@
     </p:spTree>
     <p:extLst>
       <p:ext uri="{BB962C8B-B14F-4D97-AF65-F5344CB8AC3E}">
-        <p14:creationId xmlns:p14="http://schemas.microsoft.com/office/powerpoint/2010/main" val="616681650"/>
+        <p14:creationId xmlns:p14="http://schemas.microsoft.com/office/powerpoint/2010/main" val="654758014"/>
       </p:ext>
     </p:extLst>
   </p:cSld>
@@ -2779,31 +3097,101 @@
       </p:grpSpPr>
       <p:sp>
         <p:nvSpPr>
-          <p:cNvPr id="2" name="Title Placeholder 1">
-            <a:extLst>
-              <a:ext uri="{FF2B5EF4-FFF2-40B4-BE49-F238E27FC236}">
-                <a16:creationId xmlns:a16="http://schemas.microsoft.com/office/drawing/2014/main" id="{4312B9D3-1B8C-4C9F-979E-5019428042F1}"/>
-              </a:ext>
-            </a:extLst>
-          </p:cNvPr>
-          <p:cNvSpPr>
-            <a:spLocks noGrp="1"/>
-          </p:cNvSpPr>
-          <p:nvPr>
-            <p:ph type="title"/>
-          </p:nvPr>
+          <p:cNvPr id="7" name="Rectangle 6"/>
+          <p:cNvSpPr/>
+          <p:nvPr/>
         </p:nvSpPr>
         <p:spPr>
           <a:xfrm>
-            <a:off x="838200" y="365125"/>
-            <a:ext cx="10515600" cy="1325563"/>
+            <a:off x="1" y="6400800"/>
+            <a:ext cx="12192000" cy="457200"/>
+          </a:xfrm>
+          <a:prstGeom prst="rect">
+            <a:avLst/>
+          </a:prstGeom>
+          <a:solidFill>
+            <a:schemeClr val="accent2"/>
+          </a:solidFill>
+          <a:ln>
+            <a:noFill/>
+          </a:ln>
+        </p:spPr>
+        <p:style>
+          <a:lnRef idx="2">
+            <a:schemeClr val="accent1">
+              <a:shade val="50000"/>
+            </a:schemeClr>
+          </a:lnRef>
+          <a:fillRef idx="1">
+            <a:schemeClr val="accent1"/>
+          </a:fillRef>
+          <a:effectRef idx="0">
+            <a:schemeClr val="accent1"/>
+          </a:effectRef>
+          <a:fontRef idx="minor">
+            <a:schemeClr val="lt1"/>
+          </a:fontRef>
+        </p:style>
+      </p:sp>
+      <p:sp>
+        <p:nvSpPr>
+          <p:cNvPr id="9" name="Rectangle 8"/>
+          <p:cNvSpPr/>
+          <p:nvPr/>
+        </p:nvSpPr>
+        <p:spPr>
+          <a:xfrm>
+            <a:off x="0" y="6334316"/>
+            <a:ext cx="12192001" cy="65998"/>
+          </a:xfrm>
+          <a:prstGeom prst="rect">
+            <a:avLst/>
+          </a:prstGeom>
+          <a:solidFill>
+            <a:schemeClr val="accent1"/>
+          </a:solidFill>
+          <a:ln>
+            <a:noFill/>
+          </a:ln>
+        </p:spPr>
+        <p:style>
+          <a:lnRef idx="2">
+            <a:schemeClr val="accent1">
+              <a:shade val="50000"/>
+            </a:schemeClr>
+          </a:lnRef>
+          <a:fillRef idx="1">
+            <a:schemeClr val="accent1"/>
+          </a:fillRef>
+          <a:effectRef idx="0">
+            <a:schemeClr val="accent1"/>
+          </a:effectRef>
+          <a:fontRef idx="minor">
+            <a:schemeClr val="lt1"/>
+          </a:fontRef>
+        </p:style>
+      </p:sp>
+      <p:sp>
+        <p:nvSpPr>
+          <p:cNvPr id="2" name="Title Placeholder 1"/>
+          <p:cNvSpPr>
+            <a:spLocks noGrp="1"/>
+          </p:cNvSpPr>
+          <p:nvPr>
+            <p:ph type="title"/>
+          </p:nvPr>
+        </p:nvSpPr>
+        <p:spPr>
+          <a:xfrm>
+            <a:off x="1097280" y="286603"/>
+            <a:ext cx="10058400" cy="1450757"/>
           </a:xfrm>
           <a:prstGeom prst="rect">
             <a:avLst/>
           </a:prstGeom>
         </p:spPr>
         <p:txBody>
-          <a:bodyPr vert="horz" lIns="91440" tIns="45720" rIns="91440" bIns="45720" rtlCol="0" anchor="ctr">
+          <a:bodyPr vert="horz" lIns="91440" tIns="45720" rIns="91440" bIns="45720" rtlCol="0" anchor="b">
             <a:normAutofit/>
           </a:bodyPr>
           <a:lstStyle/>
@@ -2812,18 +3200,13 @@
               <a:rPr lang="en-US"/>
               <a:t>Click to edit Master title style</a:t>
             </a:r>
-          </a:p>
-        </p:txBody>
-      </p:sp>
-      <p:sp>
-        <p:nvSpPr>
-          <p:cNvPr id="3" name="Text Placeholder 2">
-            <a:extLst>
-              <a:ext uri="{FF2B5EF4-FFF2-40B4-BE49-F238E27FC236}">
-                <a16:creationId xmlns:a16="http://schemas.microsoft.com/office/drawing/2014/main" id="{9B29FF67-1DAE-4477-BD77-F0DD5801F687}"/>
-              </a:ext>
-            </a:extLst>
-          </p:cNvPr>
+            <a:endParaRPr lang="en-US" dirty="0"/>
+          </a:p>
+        </p:txBody>
+      </p:sp>
+      <p:sp>
+        <p:nvSpPr>
+          <p:cNvPr id="3" name="Text Placeholder 2"/>
           <p:cNvSpPr>
             <a:spLocks noGrp="1"/>
           </p:cNvSpPr>
@@ -2833,15 +3216,15 @@
         </p:nvSpPr>
         <p:spPr>
           <a:xfrm>
-            <a:off x="838200" y="1825625"/>
-            <a:ext cx="10515600" cy="4351338"/>
+            <a:off x="1097280" y="1845734"/>
+            <a:ext cx="10058400" cy="4023360"/>
           </a:xfrm>
           <a:prstGeom prst="rect">
             <a:avLst/>
           </a:prstGeom>
         </p:spPr>
         <p:txBody>
-          <a:bodyPr vert="horz" lIns="91440" tIns="45720" rIns="91440" bIns="45720" rtlCol="0">
+          <a:bodyPr vert="horz" lIns="0" tIns="45720" rIns="0" bIns="45720" rtlCol="0">
             <a:normAutofit/>
           </a:bodyPr>
           <a:lstStyle/>
@@ -2879,18 +3262,13 @@
               <a:rPr lang="en-US"/>
               <a:t>Fifth level</a:t>
             </a:r>
-          </a:p>
-        </p:txBody>
-      </p:sp>
-      <p:sp>
-        <p:nvSpPr>
-          <p:cNvPr id="4" name="Date Placeholder 3">
-            <a:extLst>
-              <a:ext uri="{FF2B5EF4-FFF2-40B4-BE49-F238E27FC236}">
-                <a16:creationId xmlns:a16="http://schemas.microsoft.com/office/drawing/2014/main" id="{A7742E66-3707-47D7-A4E8-6FF0128CE403}"/>
-              </a:ext>
-            </a:extLst>
-          </p:cNvPr>
+            <a:endParaRPr lang="en-US" dirty="0"/>
+          </a:p>
+        </p:txBody>
+      </p:sp>
+      <p:sp>
+        <p:nvSpPr>
+          <p:cNvPr id="4" name="Date Placeholder 3"/>
           <p:cNvSpPr>
             <a:spLocks noGrp="1"/>
           </p:cNvSpPr>
@@ -2900,8 +3278,8 @@
         </p:nvSpPr>
         <p:spPr>
           <a:xfrm>
-            <a:off x="838200" y="6356350"/>
-            <a:ext cx="2743200" cy="365125"/>
+            <a:off x="1097280" y="6459785"/>
+            <a:ext cx="2472271" cy="365125"/>
           </a:xfrm>
           <a:prstGeom prst="rect">
             <a:avLst/>
@@ -2911,11 +3289,9 @@
           <a:bodyPr vert="horz" lIns="91440" tIns="45720" rIns="91440" bIns="45720" rtlCol="0" anchor="ctr"/>
           <a:lstStyle>
             <a:lvl1pPr algn="l">
-              <a:defRPr sz="1200">
+              <a:defRPr sz="900">
                 <a:solidFill>
-                  <a:schemeClr val="tx1">
-                    <a:tint val="75000"/>
-                  </a:schemeClr>
+                  <a:srgbClr val="FFFFFF"/>
                 </a:solidFill>
               </a:defRPr>
             </a:lvl1pPr>
@@ -2931,13 +3307,7 @@
       </p:sp>
       <p:sp>
         <p:nvSpPr>
-          <p:cNvPr id="5" name="Footer Placeholder 4">
-            <a:extLst>
-              <a:ext uri="{FF2B5EF4-FFF2-40B4-BE49-F238E27FC236}">
-                <a16:creationId xmlns:a16="http://schemas.microsoft.com/office/drawing/2014/main" id="{F51B3AE6-E5E4-4472-A405-0978D481B295}"/>
-              </a:ext>
-            </a:extLst>
-          </p:cNvPr>
+          <p:cNvPr id="5" name="Footer Placeholder 4"/>
           <p:cNvSpPr>
             <a:spLocks noGrp="1"/>
           </p:cNvSpPr>
@@ -2947,8 +3317,8 @@
         </p:nvSpPr>
         <p:spPr>
           <a:xfrm>
-            <a:off x="4038600" y="6356350"/>
-            <a:ext cx="4114800" cy="365125"/>
+            <a:off x="3686185" y="6459785"/>
+            <a:ext cx="4822804" cy="365125"/>
           </a:xfrm>
           <a:prstGeom prst="rect">
             <a:avLst/>
@@ -2958,11 +3328,9 @@
           <a:bodyPr vert="horz" lIns="91440" tIns="45720" rIns="91440" bIns="45720" rtlCol="0" anchor="ctr"/>
           <a:lstStyle>
             <a:lvl1pPr algn="ctr">
-              <a:defRPr sz="1200">
+              <a:defRPr sz="900" cap="all" baseline="0">
                 <a:solidFill>
-                  <a:schemeClr val="tx1">
-                    <a:tint val="75000"/>
-                  </a:schemeClr>
+                  <a:srgbClr val="FFFFFF"/>
                 </a:solidFill>
               </a:defRPr>
             </a:lvl1pPr>
@@ -2974,13 +3342,7 @@
       </p:sp>
       <p:sp>
         <p:nvSpPr>
-          <p:cNvPr id="6" name="Slide Number Placeholder 5">
-            <a:extLst>
-              <a:ext uri="{FF2B5EF4-FFF2-40B4-BE49-F238E27FC236}">
-                <a16:creationId xmlns:a16="http://schemas.microsoft.com/office/drawing/2014/main" id="{67E81AB1-3473-4E2D-AF90-4D4B5BF4110C}"/>
-              </a:ext>
-            </a:extLst>
-          </p:cNvPr>
+          <p:cNvPr id="6" name="Slide Number Placeholder 5"/>
           <p:cNvSpPr>
             <a:spLocks noGrp="1"/>
           </p:cNvSpPr>
@@ -2990,8 +3352,8 @@
         </p:nvSpPr>
         <p:spPr>
           <a:xfrm>
-            <a:off x="8610600" y="6356350"/>
-            <a:ext cx="2743200" cy="365125"/>
+            <a:off x="9900458" y="6459785"/>
+            <a:ext cx="1312025" cy="365125"/>
           </a:xfrm>
           <a:prstGeom prst="rect">
             <a:avLst/>
@@ -3001,11 +3363,9 @@
           <a:bodyPr vert="horz" lIns="91440" tIns="45720" rIns="91440" bIns="45720" rtlCol="0" anchor="ctr"/>
           <a:lstStyle>
             <a:lvl1pPr algn="r">
-              <a:defRPr sz="1200">
+              <a:defRPr sz="1050">
                 <a:solidFill>
-                  <a:schemeClr val="tx1">
-                    <a:tint val="75000"/>
-                  </a:schemeClr>
+                  <a:srgbClr val="FFFFFF"/>
                 </a:solidFill>
               </a:defRPr>
             </a:lvl1pPr>
@@ -3019,40 +3379,81 @@
           </a:p>
         </p:txBody>
       </p:sp>
+      <p:cxnSp>
+        <p:nvCxnSpPr>
+          <p:cNvPr id="10" name="Straight Connector 9"/>
+          <p:cNvCxnSpPr/>
+          <p:nvPr/>
+        </p:nvCxnSpPr>
+        <p:spPr>
+          <a:xfrm>
+            <a:off x="1193532" y="1737845"/>
+            <a:ext cx="9966960" cy="0"/>
+          </a:xfrm>
+          <a:prstGeom prst="line">
+            <a:avLst/>
+          </a:prstGeom>
+          <a:ln w="6350">
+            <a:solidFill>
+              <a:schemeClr val="tx1">
+                <a:lumMod val="50000"/>
+                <a:lumOff val="50000"/>
+              </a:schemeClr>
+            </a:solidFill>
+          </a:ln>
+        </p:spPr>
+        <p:style>
+          <a:lnRef idx="1">
+            <a:schemeClr val="accent1"/>
+          </a:lnRef>
+          <a:fillRef idx="0">
+            <a:schemeClr val="accent1"/>
+          </a:fillRef>
+          <a:effectRef idx="0">
+            <a:schemeClr val="accent1"/>
+          </a:effectRef>
+          <a:fontRef idx="minor">
+            <a:schemeClr val="tx1"/>
+          </a:fontRef>
+        </p:style>
+      </p:cxnSp>
     </p:spTree>
     <p:extLst>
       <p:ext uri="{BB962C8B-B14F-4D97-AF65-F5344CB8AC3E}">
-        <p14:creationId xmlns:p14="http://schemas.microsoft.com/office/powerpoint/2010/main" val="3540338523"/>
+        <p14:creationId xmlns:p14="http://schemas.microsoft.com/office/powerpoint/2010/main" val="3662833478"/>
       </p:ext>
     </p:extLst>
   </p:cSld>
   <p:clrMap bg1="lt1" tx1="dk1" bg2="lt2" tx2="dk2" accent1="accent1" accent2="accent2" accent3="accent3" accent4="accent4" accent5="accent5" accent6="accent6" hlink="hlink" folHlink="folHlink"/>
   <p:sldLayoutIdLst>
-    <p:sldLayoutId id="2147483649" r:id="rId1"/>
-    <p:sldLayoutId id="2147483650" r:id="rId2"/>
-    <p:sldLayoutId id="2147483651" r:id="rId3"/>
-    <p:sldLayoutId id="2147483652" r:id="rId4"/>
-    <p:sldLayoutId id="2147483653" r:id="rId5"/>
-    <p:sldLayoutId id="2147483654" r:id="rId6"/>
-    <p:sldLayoutId id="2147483655" r:id="rId7"/>
-    <p:sldLayoutId id="2147483656" r:id="rId8"/>
-    <p:sldLayoutId id="2147483657" r:id="rId9"/>
-    <p:sldLayoutId id="2147483658" r:id="rId10"/>
-    <p:sldLayoutId id="2147483659" r:id="rId11"/>
+    <p:sldLayoutId id="2147483661" r:id="rId1"/>
+    <p:sldLayoutId id="2147483662" r:id="rId2"/>
+    <p:sldLayoutId id="2147483663" r:id="rId3"/>
+    <p:sldLayoutId id="2147483664" r:id="rId4"/>
+    <p:sldLayoutId id="2147483665" r:id="rId5"/>
+    <p:sldLayoutId id="2147483666" r:id="rId6"/>
+    <p:sldLayoutId id="2147483667" r:id="rId7"/>
+    <p:sldLayoutId id="2147483668" r:id="rId8"/>
+    <p:sldLayoutId id="2147483669" r:id="rId9"/>
+    <p:sldLayoutId id="2147483670" r:id="rId10"/>
+    <p:sldLayoutId id="2147483671" r:id="rId11"/>
   </p:sldLayoutIdLst>
   <p:txStyles>
     <p:titleStyle>
       <a:lvl1pPr algn="l" defTabSz="914400" rtl="0" eaLnBrk="1" latinLnBrk="0" hangingPunct="1">
         <a:lnSpc>
-          <a:spcPct val="90000"/>
+          <a:spcPct val="85000"/>
         </a:lnSpc>
         <a:spcBef>
           <a:spcPct val="0"/>
         </a:spcBef>
         <a:buNone/>
-        <a:defRPr sz="4400" kern="1200">
+        <a:defRPr sz="4800" kern="1200" spc="-50" baseline="0">
           <a:solidFill>
-            <a:schemeClr val="tx1"/>
+            <a:schemeClr val="tx1">
+              <a:lumMod val="75000"/>
+              <a:lumOff val="25000"/>
+            </a:schemeClr>
           </a:solidFill>
           <a:latin typeface="+mj-lt"/>
           <a:ea typeface="+mj-ea"/>
@@ -3061,162 +3462,244 @@
       </a:lvl1pPr>
     </p:titleStyle>
     <p:bodyStyle>
-      <a:lvl1pPr marL="228600" indent="-228600" algn="l" defTabSz="914400" rtl="0" eaLnBrk="1" latinLnBrk="0" hangingPunct="1">
+      <a:lvl1pPr marL="91440" indent="-91440" algn="l" defTabSz="914400" rtl="0" eaLnBrk="1" latinLnBrk="0" hangingPunct="1">
         <a:lnSpc>
           <a:spcPct val="90000"/>
         </a:lnSpc>
         <a:spcBef>
-          <a:spcPts val="1000"/>
+          <a:spcPts val="1200"/>
         </a:spcBef>
-        <a:buFont typeface="Arial" panose="020B0604020202020204" pitchFamily="34" charset="0"/>
-        <a:buChar char="•"/>
-        <a:defRPr sz="2800" kern="1200">
+        <a:spcAft>
+          <a:spcPts val="200"/>
+        </a:spcAft>
+        <a:buClr>
+          <a:schemeClr val="accent1"/>
+        </a:buClr>
+        <a:buSzPct val="100000"/>
+        <a:buFont typeface="Calibri" panose="020F0502020204030204" pitchFamily="34" charset="0"/>
+        <a:buChar char=" "/>
+        <a:defRPr sz="2000" kern="1200">
           <a:solidFill>
-            <a:schemeClr val="tx1"/>
+            <a:schemeClr val="tx1">
+              <a:lumMod val="75000"/>
+              <a:lumOff val="25000"/>
+            </a:schemeClr>
           </a:solidFill>
           <a:latin typeface="+mn-lt"/>
           <a:ea typeface="+mn-ea"/>
           <a:cs typeface="+mn-cs"/>
         </a:defRPr>
       </a:lvl1pPr>
-      <a:lvl2pPr marL="685800" indent="-228600" algn="l" defTabSz="914400" rtl="0" eaLnBrk="1" latinLnBrk="0" hangingPunct="1">
+      <a:lvl2pPr marL="384048" indent="-182880" algn="l" defTabSz="914400" rtl="0" eaLnBrk="1" latinLnBrk="0" hangingPunct="1">
         <a:lnSpc>
           <a:spcPct val="90000"/>
         </a:lnSpc>
         <a:spcBef>
-          <a:spcPts val="500"/>
+          <a:spcPts val="200"/>
         </a:spcBef>
-        <a:buFont typeface="Arial" panose="020B0604020202020204" pitchFamily="34" charset="0"/>
-        <a:buChar char="•"/>
-        <a:defRPr sz="2400" kern="1200">
+        <a:spcAft>
+          <a:spcPts val="400"/>
+        </a:spcAft>
+        <a:buClr>
+          <a:schemeClr val="accent1"/>
+        </a:buClr>
+        <a:buFont typeface="Calibri" pitchFamily="34" charset="0"/>
+        <a:buChar char="◦"/>
+        <a:defRPr sz="1800" kern="1200">
           <a:solidFill>
-            <a:schemeClr val="tx1"/>
+            <a:schemeClr val="tx1">
+              <a:lumMod val="75000"/>
+              <a:lumOff val="25000"/>
+            </a:schemeClr>
           </a:solidFill>
           <a:latin typeface="+mn-lt"/>
           <a:ea typeface="+mn-ea"/>
           <a:cs typeface="+mn-cs"/>
         </a:defRPr>
       </a:lvl2pPr>
-      <a:lvl3pPr marL="1143000" indent="-228600" algn="l" defTabSz="914400" rtl="0" eaLnBrk="1" latinLnBrk="0" hangingPunct="1">
+      <a:lvl3pPr marL="566928" indent="-182880" algn="l" defTabSz="914400" rtl="0" eaLnBrk="1" latinLnBrk="0" hangingPunct="1">
         <a:lnSpc>
           <a:spcPct val="90000"/>
         </a:lnSpc>
         <a:spcBef>
-          <a:spcPts val="500"/>
+          <a:spcPts val="200"/>
         </a:spcBef>
-        <a:buFont typeface="Arial" panose="020B0604020202020204" pitchFamily="34" charset="0"/>
-        <a:buChar char="•"/>
-        <a:defRPr sz="2000" kern="1200">
+        <a:spcAft>
+          <a:spcPts val="400"/>
+        </a:spcAft>
+        <a:buClr>
+          <a:schemeClr val="accent1"/>
+        </a:buClr>
+        <a:buFont typeface="Calibri" pitchFamily="34" charset="0"/>
+        <a:buChar char="◦"/>
+        <a:defRPr sz="1400" kern="1200">
           <a:solidFill>
-            <a:schemeClr val="tx1"/>
+            <a:schemeClr val="tx1">
+              <a:lumMod val="75000"/>
+              <a:lumOff val="25000"/>
+            </a:schemeClr>
           </a:solidFill>
           <a:latin typeface="+mn-lt"/>
           <a:ea typeface="+mn-ea"/>
           <a:cs typeface="+mn-cs"/>
         </a:defRPr>
       </a:lvl3pPr>
-      <a:lvl4pPr marL="1600200" indent="-228600" algn="l" defTabSz="914400" rtl="0" eaLnBrk="1" latinLnBrk="0" hangingPunct="1">
+      <a:lvl4pPr marL="749808" indent="-182880" algn="l" defTabSz="914400" rtl="0" eaLnBrk="1" latinLnBrk="0" hangingPunct="1">
         <a:lnSpc>
           <a:spcPct val="90000"/>
         </a:lnSpc>
         <a:spcBef>
-          <a:spcPts val="500"/>
+          <a:spcPts val="200"/>
         </a:spcBef>
-        <a:buFont typeface="Arial" panose="020B0604020202020204" pitchFamily="34" charset="0"/>
-        <a:buChar char="•"/>
-        <a:defRPr sz="1800" kern="1200">
+        <a:spcAft>
+          <a:spcPts val="400"/>
+        </a:spcAft>
+        <a:buClr>
+          <a:schemeClr val="accent1"/>
+        </a:buClr>
+        <a:buFont typeface="Calibri" pitchFamily="34" charset="0"/>
+        <a:buChar char="◦"/>
+        <a:defRPr sz="1400" kern="1200">
           <a:solidFill>
-            <a:schemeClr val="tx1"/>
+            <a:schemeClr val="tx1">
+              <a:lumMod val="75000"/>
+              <a:lumOff val="25000"/>
+            </a:schemeClr>
           </a:solidFill>
           <a:latin typeface="+mn-lt"/>
           <a:ea typeface="+mn-ea"/>
           <a:cs typeface="+mn-cs"/>
         </a:defRPr>
       </a:lvl4pPr>
-      <a:lvl5pPr marL="2057400" indent="-228600" algn="l" defTabSz="914400" rtl="0" eaLnBrk="1" latinLnBrk="0" hangingPunct="1">
+      <a:lvl5pPr marL="932688" indent="-182880" algn="l" defTabSz="914400" rtl="0" eaLnBrk="1" latinLnBrk="0" hangingPunct="1">
         <a:lnSpc>
           <a:spcPct val="90000"/>
         </a:lnSpc>
         <a:spcBef>
-          <a:spcPts val="500"/>
+          <a:spcPts val="200"/>
         </a:spcBef>
-        <a:buFont typeface="Arial" panose="020B0604020202020204" pitchFamily="34" charset="0"/>
-        <a:buChar char="•"/>
-        <a:defRPr sz="1800" kern="1200">
+        <a:spcAft>
+          <a:spcPts val="400"/>
+        </a:spcAft>
+        <a:buClr>
+          <a:schemeClr val="accent1"/>
+        </a:buClr>
+        <a:buFont typeface="Calibri" pitchFamily="34" charset="0"/>
+        <a:buChar char="◦"/>
+        <a:defRPr sz="1400" kern="1200">
           <a:solidFill>
-            <a:schemeClr val="tx1"/>
+            <a:schemeClr val="tx1">
+              <a:lumMod val="75000"/>
+              <a:lumOff val="25000"/>
+            </a:schemeClr>
           </a:solidFill>
           <a:latin typeface="+mn-lt"/>
           <a:ea typeface="+mn-ea"/>
           <a:cs typeface="+mn-cs"/>
         </a:defRPr>
       </a:lvl5pPr>
-      <a:lvl6pPr marL="2514600" indent="-228600" algn="l" defTabSz="914400" rtl="0" eaLnBrk="1" latinLnBrk="0" hangingPunct="1">
+      <a:lvl6pPr marL="1100000" indent="-228600" algn="l" defTabSz="914400" rtl="0" eaLnBrk="1" latinLnBrk="0" hangingPunct="1">
         <a:lnSpc>
           <a:spcPct val="90000"/>
         </a:lnSpc>
         <a:spcBef>
-          <a:spcPts val="500"/>
+          <a:spcPts val="200"/>
         </a:spcBef>
-        <a:buFont typeface="Arial" panose="020B0604020202020204" pitchFamily="34" charset="0"/>
-        <a:buChar char="•"/>
-        <a:defRPr sz="1800" kern="1200">
+        <a:spcAft>
+          <a:spcPts val="400"/>
+        </a:spcAft>
+        <a:buClr>
+          <a:schemeClr val="accent1"/>
+        </a:buClr>
+        <a:buFont typeface="Calibri" pitchFamily="34" charset="0"/>
+        <a:buChar char="◦"/>
+        <a:defRPr sz="1400" kern="1200">
           <a:solidFill>
-            <a:schemeClr val="tx1"/>
+            <a:schemeClr val="tx1">
+              <a:lumMod val="75000"/>
+              <a:lumOff val="25000"/>
+            </a:schemeClr>
           </a:solidFill>
           <a:latin typeface="+mn-lt"/>
           <a:ea typeface="+mn-ea"/>
           <a:cs typeface="+mn-cs"/>
         </a:defRPr>
       </a:lvl6pPr>
-      <a:lvl7pPr marL="2971800" indent="-228600" algn="l" defTabSz="914400" rtl="0" eaLnBrk="1" latinLnBrk="0" hangingPunct="1">
+      <a:lvl7pPr marL="1300000" indent="-228600" algn="l" defTabSz="914400" rtl="0" eaLnBrk="1" latinLnBrk="0" hangingPunct="1">
         <a:lnSpc>
           <a:spcPct val="90000"/>
         </a:lnSpc>
         <a:spcBef>
-          <a:spcPts val="500"/>
+          <a:spcPts val="200"/>
         </a:spcBef>
-        <a:buFont typeface="Arial" panose="020B0604020202020204" pitchFamily="34" charset="0"/>
-        <a:buChar char="•"/>
-        <a:defRPr sz="1800" kern="1200">
+        <a:spcAft>
+          <a:spcPts val="400"/>
+        </a:spcAft>
+        <a:buClr>
+          <a:schemeClr val="accent1"/>
+        </a:buClr>
+        <a:buFont typeface="Calibri" pitchFamily="34" charset="0"/>
+        <a:buChar char="◦"/>
+        <a:defRPr sz="1400" kern="1200">
           <a:solidFill>
-            <a:schemeClr val="tx1"/>
+            <a:schemeClr val="tx1">
+              <a:lumMod val="75000"/>
+              <a:lumOff val="25000"/>
+            </a:schemeClr>
           </a:solidFill>
           <a:latin typeface="+mn-lt"/>
           <a:ea typeface="+mn-ea"/>
           <a:cs typeface="+mn-cs"/>
         </a:defRPr>
       </a:lvl7pPr>
-      <a:lvl8pPr marL="3429000" indent="-228600" algn="l" defTabSz="914400" rtl="0" eaLnBrk="1" latinLnBrk="0" hangingPunct="1">
+      <a:lvl8pPr marL="1500000" indent="-228600" algn="l" defTabSz="914400" rtl="0" eaLnBrk="1" latinLnBrk="0" hangingPunct="1">
         <a:lnSpc>
           <a:spcPct val="90000"/>
         </a:lnSpc>
         <a:spcBef>
-          <a:spcPts val="500"/>
+          <a:spcPts val="200"/>
         </a:spcBef>
-        <a:buFont typeface="Arial" panose="020B0604020202020204" pitchFamily="34" charset="0"/>
-        <a:buChar char="•"/>
-        <a:defRPr sz="1800" kern="1200">
+        <a:spcAft>
+          <a:spcPts val="400"/>
+        </a:spcAft>
+        <a:buClr>
+          <a:schemeClr val="accent1"/>
+        </a:buClr>
+        <a:buFont typeface="Calibri" pitchFamily="34" charset="0"/>
+        <a:buChar char="◦"/>
+        <a:defRPr sz="1400" kern="1200">
           <a:solidFill>
-            <a:schemeClr val="tx1"/>
+            <a:schemeClr val="tx1">
+              <a:lumMod val="75000"/>
+              <a:lumOff val="25000"/>
+            </a:schemeClr>
           </a:solidFill>
           <a:latin typeface="+mn-lt"/>
           <a:ea typeface="+mn-ea"/>
           <a:cs typeface="+mn-cs"/>
         </a:defRPr>
       </a:lvl8pPr>
-      <a:lvl9pPr marL="3886200" indent="-228600" algn="l" defTabSz="914400" rtl="0" eaLnBrk="1" latinLnBrk="0" hangingPunct="1">
+      <a:lvl9pPr marL="1700000" indent="-228600" algn="l" defTabSz="914400" rtl="0" eaLnBrk="1" latinLnBrk="0" hangingPunct="1">
         <a:lnSpc>
           <a:spcPct val="90000"/>
         </a:lnSpc>
         <a:spcBef>
-          <a:spcPts val="500"/>
+          <a:spcPts val="200"/>
         </a:spcBef>
-        <a:buFont typeface="Arial" panose="020B0604020202020204" pitchFamily="34" charset="0"/>
-        <a:buChar char="•"/>
-        <a:defRPr sz="1800" kern="1200">
+        <a:spcAft>
+          <a:spcPts val="400"/>
+        </a:spcAft>
+        <a:buClr>
+          <a:schemeClr val="accent1"/>
+        </a:buClr>
+        <a:buFont typeface="Calibri" pitchFamily="34" charset="0"/>
+        <a:buChar char="◦"/>
+        <a:defRPr sz="1400" kern="1200">
           <a:solidFill>
-            <a:schemeClr val="tx1"/>
+            <a:schemeClr val="tx1">
+              <a:lumMod val="75000"/>
+              <a:lumOff val="25000"/>
+            </a:schemeClr>
           </a:solidFill>
           <a:latin typeface="+mn-lt"/>
           <a:ea typeface="+mn-ea"/>
@@ -3484,7 +3967,7 @@
         </p:blipFill>
         <p:spPr>
           <a:xfrm>
-            <a:off x="4310062" y="2743994"/>
+            <a:off x="4340225" y="2600325"/>
             <a:ext cx="3571875" cy="2514600"/>
           </a:xfrm>
           <a:prstGeom prst="rect">
@@ -3545,7 +4028,7 @@
           <a:p>
             <a:r>
               <a:rPr lang="en-US" dirty="0"/>
-              <a:t>Days on Our Clock</a:t>
+              <a:t>Histogram: Days on Our Clock</a:t>
             </a:r>
           </a:p>
         </p:txBody>
@@ -3574,7 +4057,7 @@
         </p:blipFill>
         <p:spPr>
           <a:xfrm>
-            <a:off x="4310062" y="2743994"/>
+            <a:off x="4340225" y="2600325"/>
             <a:ext cx="3571875" cy="2514600"/>
           </a:xfrm>
           <a:prstGeom prst="rect">
@@ -3659,11 +4142,11 @@
         <p:spPr/>
         <p:txBody>
           <a:bodyPr>
-            <a:normAutofit fontScale="92500" lnSpcReduction="20000"/>
+            <a:normAutofit fontScale="85000" lnSpcReduction="20000"/>
           </a:bodyPr>
           <a:lstStyle/>
           <a:p>
-            <a:pPr marL="0" marR="0">
+            <a:pPr marL="251460" marR="0" indent="-342900">
               <a:lnSpc>
                 <a:spcPct val="107000"/>
               </a:lnSpc>
@@ -3673,6 +4156,8 @@
               <a:spcAft>
                 <a:spcPts val="800"/>
               </a:spcAft>
+              <a:buFont typeface="+mj-lt"/>
+              <a:buAutoNum type="arabicPeriod"/>
             </a:pPr>
             <a:r>
               <a:rPr lang="en-US" sz="1800" dirty="0">
@@ -3685,7 +4170,7 @@
             </a:r>
           </a:p>
           <a:p>
-            <a:pPr marL="0" marR="0">
+            <a:pPr marL="251460" marR="0" indent="-342900">
               <a:lnSpc>
                 <a:spcPct val="107000"/>
               </a:lnSpc>
@@ -3695,6 +4180,8 @@
               <a:spcAft>
                 <a:spcPts val="800"/>
               </a:spcAft>
+              <a:buFont typeface="+mj-lt"/>
+              <a:buAutoNum type="arabicPeriod"/>
             </a:pPr>
             <a:r>
               <a:rPr lang="en-US" sz="1800" dirty="0">
@@ -3707,7 +4194,7 @@
             </a:r>
           </a:p>
           <a:p>
-            <a:pPr marL="0" marR="0">
+            <a:pPr marL="251460" marR="0" indent="-342900">
               <a:lnSpc>
                 <a:spcPct val="107000"/>
               </a:lnSpc>
@@ -3717,6 +4204,8 @@
               <a:spcAft>
                 <a:spcPts val="800"/>
               </a:spcAft>
+              <a:buFont typeface="+mj-lt"/>
+              <a:buAutoNum type="arabicPeriod"/>
             </a:pPr>
             <a:r>
               <a:rPr lang="en-US" sz="1800" dirty="0">
@@ -3729,7 +4218,7 @@
             </a:r>
           </a:p>
           <a:p>
-            <a:pPr marL="0" marR="0">
+            <a:pPr marL="251460" marR="0" indent="-342900">
               <a:lnSpc>
                 <a:spcPct val="107000"/>
               </a:lnSpc>
@@ -3739,6 +4228,8 @@
               <a:spcAft>
                 <a:spcPts val="800"/>
               </a:spcAft>
+              <a:buFont typeface="+mj-lt"/>
+              <a:buAutoNum type="arabicPeriod"/>
             </a:pPr>
             <a:r>
               <a:rPr lang="en-US" sz="1800" dirty="0">
@@ -3751,7 +4242,7 @@
             </a:r>
           </a:p>
           <a:p>
-            <a:pPr marL="0" marR="0">
+            <a:pPr marL="251460" marR="0" indent="-342900">
               <a:lnSpc>
                 <a:spcPct val="107000"/>
               </a:lnSpc>
@@ -3761,6 +4252,8 @@
               <a:spcAft>
                 <a:spcPts val="800"/>
               </a:spcAft>
+              <a:buFont typeface="+mj-lt"/>
+              <a:buAutoNum type="arabicPeriod"/>
             </a:pPr>
             <a:r>
               <a:rPr lang="en-US" sz="1800" dirty="0">
@@ -3773,7 +4266,7 @@
             </a:r>
           </a:p>
           <a:p>
-            <a:pPr marL="0" marR="0">
+            <a:pPr marL="251460" marR="0" indent="-342900">
               <a:lnSpc>
                 <a:spcPct val="107000"/>
               </a:lnSpc>
@@ -3783,6 +4276,8 @@
               <a:spcAft>
                 <a:spcPts val="800"/>
               </a:spcAft>
+              <a:buFont typeface="+mj-lt"/>
+              <a:buAutoNum type="arabicPeriod"/>
             </a:pPr>
             <a:r>
               <a:rPr lang="en-US" sz="1800" dirty="0">
@@ -3881,8 +4376,8 @@
         </p:blipFill>
         <p:spPr>
           <a:xfrm>
-            <a:off x="1005402" y="1825625"/>
-            <a:ext cx="10181195" cy="4351338"/>
+            <a:off x="1420007" y="1846263"/>
+            <a:ext cx="9412311" cy="4022725"/>
           </a:xfrm>
         </p:spPr>
       </p:pic>
@@ -3977,7 +4472,7 @@
         </p:blipFill>
         <p:spPr>
           <a:xfrm>
-            <a:off x="4200525" y="2734469"/>
+            <a:off x="4230688" y="2590800"/>
             <a:ext cx="3790950" cy="2533650"/>
           </a:xfrm>
           <a:prstGeom prst="rect">
@@ -4109,8 +4604,8 @@
         </p:blipFill>
         <p:spPr>
           <a:xfrm>
-            <a:off x="2028825" y="1796343"/>
-            <a:ext cx="8134350" cy="4286250"/>
+            <a:off x="2842260" y="1796348"/>
+            <a:ext cx="6507480" cy="3429000"/>
           </a:xfrm>
         </p:spPr>
       </p:pic>
@@ -4128,7 +4623,7 @@
         </p:nvSpPr>
         <p:spPr>
           <a:xfrm>
-            <a:off x="708991" y="6082593"/>
+            <a:off x="739471" y="5225348"/>
             <a:ext cx="10774017" cy="646331"/>
           </a:xfrm>
           <a:prstGeom prst="rect">
@@ -4231,7 +4726,7 @@
         </p:blipFill>
         <p:spPr>
           <a:xfrm>
-            <a:off x="4257675" y="2677319"/>
+            <a:off x="4287838" y="2533650"/>
             <a:ext cx="3676650" cy="2647950"/>
           </a:xfrm>
           <a:prstGeom prst="rect">
@@ -4322,7 +4817,9 @@
         </p:nvSpPr>
         <p:spPr/>
         <p:txBody>
-          <a:bodyPr/>
+          <a:bodyPr>
+            <a:normAutofit fontScale="90000"/>
+          </a:bodyPr>
           <a:lstStyle/>
           <a:p>
             <a:r>
@@ -4363,7 +4860,7 @@
         </p:blipFill>
         <p:spPr>
           <a:xfrm>
-            <a:off x="4243387" y="2753519"/>
+            <a:off x="4273550" y="2609850"/>
             <a:ext cx="3705225" cy="2495550"/>
           </a:xfrm>
           <a:prstGeom prst="rect">
@@ -4454,7 +4951,9 @@
         </p:nvSpPr>
         <p:spPr/>
         <p:txBody>
-          <a:bodyPr/>
+          <a:bodyPr>
+            <a:normAutofit fontScale="90000"/>
+          </a:bodyPr>
           <a:lstStyle/>
           <a:p>
             <a:r>
@@ -4495,7 +4994,7 @@
         </p:blipFill>
         <p:spPr>
           <a:xfrm>
-            <a:off x="4243387" y="2753519"/>
+            <a:off x="4273550" y="2609850"/>
             <a:ext cx="3705225" cy="2495550"/>
           </a:xfrm>
           <a:prstGeom prst="rect">
@@ -4620,7 +5119,7 @@
         </p:blipFill>
         <p:spPr>
           <a:xfrm>
-            <a:off x="4257675" y="2753519"/>
+            <a:off x="4287838" y="2609850"/>
             <a:ext cx="3676650" cy="2495550"/>
           </a:xfrm>
           <a:prstGeom prst="rect">
@@ -4865,7 +5364,7 @@
         </p:blipFill>
         <p:spPr>
           <a:xfrm>
-            <a:off x="4200525" y="2734469"/>
+            <a:off x="4230688" y="2590800"/>
             <a:ext cx="3790950" cy="2533650"/>
           </a:xfrm>
           <a:prstGeom prst="rect">
@@ -5065,19 +5564,15 @@
         </p:nvSpPr>
         <p:spPr/>
         <p:txBody>
-          <a:bodyPr/>
-          <a:lstStyle/>
-          <a:p>
-            <a:r>
-              <a:rPr lang="en-US" sz="1800" dirty="0">
-                <a:effectLst/>
-                <a:latin typeface="Calibri" panose="020F0502020204030204" pitchFamily="34" charset="0"/>
-                <a:ea typeface="Calibri" panose="020F0502020204030204" pitchFamily="34" charset="0"/>
-                <a:cs typeface="Times New Roman" panose="02020603050405020304" pitchFamily="18" charset="0"/>
-              </a:rPr>
+          <a:bodyPr>
+            <a:normAutofit/>
+          </a:bodyPr>
+          <a:lstStyle/>
+          <a:p>
+            <a:r>
+              <a:rPr lang="en-US" sz="3600" dirty="0"/>
               <a:t>What variables could have an impact on our question?</a:t>
             </a:r>
-            <a:endParaRPr lang="en-US" dirty="0"/>
           </a:p>
         </p:txBody>
       </p:sp>
@@ -5298,22 +5793,15 @@
         </p:nvSpPr>
         <p:spPr/>
         <p:txBody>
-          <a:bodyPr/>
-          <a:lstStyle/>
-          <a:p>
-            <a:r>
-              <a:rPr lang="en-US" sz="1800" b="1" kern="0" dirty="0">
-                <a:solidFill>
-                  <a:srgbClr val="2F5496"/>
-                </a:solidFill>
-                <a:effectLst/>
-                <a:latin typeface="Calibri Light" panose="020F0302020204030204" pitchFamily="34" charset="0"/>
-                <a:ea typeface="Times New Roman" panose="02020603050405020304" pitchFamily="18" charset="0"/>
-                <a:cs typeface="Times New Roman" panose="02020603050405020304" pitchFamily="18" charset="0"/>
-              </a:rPr>
+          <a:bodyPr>
+            <a:normAutofit/>
+          </a:bodyPr>
+          <a:lstStyle/>
+          <a:p>
+            <a:r>
+              <a:rPr lang="en-US" sz="4000" dirty="0"/>
               <a:t>Describe what the variables mean in the dataset</a:t>
             </a:r>
-            <a:endParaRPr lang="en-US" dirty="0"/>
           </a:p>
         </p:txBody>
       </p:sp>
@@ -5340,9 +5828,9 @@
           </a:bodyPr>
           <a:lstStyle/>
           <a:p>
-            <a:pPr marL="342900" marR="0" lvl="0" indent="-342900">
+            <a:pPr marL="342900" indent="-342900">
               <a:lnSpc>
-                <a:spcPct val="107000"/>
+                <a:spcPct val="100000"/>
               </a:lnSpc>
               <a:spcBef>
                 <a:spcPts val="0"/>
@@ -5355,18 +5843,16 @@
             </a:pPr>
             <a:r>
               <a:rPr lang="en-US" sz="1800" dirty="0">
-                <a:effectLst/>
                 <a:latin typeface="Calibri" panose="020F0502020204030204" pitchFamily="34" charset="0"/>
-                <a:ea typeface="Calibri" panose="020F0502020204030204" pitchFamily="34" charset="0"/>
                 <a:cs typeface="Times New Roman" panose="02020603050405020304" pitchFamily="18" charset="0"/>
               </a:rPr>
               <a:t>Status: This is a calculated, categorical field that determines what part of the order lifecycle this equipment is currently in. For instance, a value of End Asset Usage indicates that the equipment has been returned and rental fees have stopped accumulating. A value of Released Loaded indicates that the equipment is currently loaded with product and moving towards its final destination.</a:t>
             </a:r>
           </a:p>
           <a:p>
-            <a:pPr marL="342900" marR="0" lvl="0" indent="-342900">
+            <a:pPr marL="342900" indent="-342900">
               <a:lnSpc>
-                <a:spcPct val="107000"/>
+                <a:spcPct val="100000"/>
               </a:lnSpc>
               <a:spcBef>
                 <a:spcPts val="0"/>
@@ -5379,18 +5865,16 @@
             </a:pPr>
             <a:r>
               <a:rPr lang="en-US" sz="1800" dirty="0">
-                <a:effectLst/>
                 <a:latin typeface="Calibri" panose="020F0502020204030204" pitchFamily="34" charset="0"/>
-                <a:ea typeface="Calibri" panose="020F0502020204030204" pitchFamily="34" charset="0"/>
                 <a:cs typeface="Times New Roman" panose="02020603050405020304" pitchFamily="18" charset="0"/>
               </a:rPr>
               <a:t>Allocated Customer: This is the customer that is currently in control of the equipment. This variable is a calculated field which takes into account many aspects of the shipment including last carrier to touch the equipment, last person to report an event, and what the Event Description/Stop Type/Equipment Status combination of values was at that time.</a:t>
             </a:r>
           </a:p>
           <a:p>
-            <a:pPr marL="342900" marR="0" lvl="0" indent="-342900">
+            <a:pPr marL="342900" indent="-342900">
               <a:lnSpc>
-                <a:spcPct val="107000"/>
+                <a:spcPct val="100000"/>
               </a:lnSpc>
               <a:spcBef>
                 <a:spcPts val="0"/>
@@ -5403,18 +5887,16 @@
             </a:pPr>
             <a:r>
               <a:rPr lang="en-US" sz="1800" dirty="0">
-                <a:effectLst/>
                 <a:latin typeface="Calibri" panose="020F0502020204030204" pitchFamily="34" charset="0"/>
-                <a:ea typeface="Calibri" panose="020F0502020204030204" pitchFamily="34" charset="0"/>
                 <a:cs typeface="Times New Roman" panose="02020603050405020304" pitchFamily="18" charset="0"/>
               </a:rPr>
               <a:t>Last Event Loc: The location where the last reported activity for this equipment happened. This is a location name known only within this system but is more specific than the simple city/state value that can be found in field Last Event City State.</a:t>
             </a:r>
           </a:p>
           <a:p>
-            <a:pPr marL="342900" marR="0" lvl="0" indent="-342900">
+            <a:pPr marL="342900" indent="-342900">
               <a:lnSpc>
-                <a:spcPct val="107000"/>
+                <a:spcPct val="100000"/>
               </a:lnSpc>
               <a:spcBef>
                 <a:spcPts val="0"/>
@@ -5427,28 +5909,33 @@
             </a:pPr>
             <a:r>
               <a:rPr lang="en-US" sz="1800" dirty="0">
-                <a:effectLst/>
                 <a:latin typeface="Calibri" panose="020F0502020204030204" pitchFamily="34" charset="0"/>
-                <a:ea typeface="Calibri" panose="020F0502020204030204" pitchFamily="34" charset="0"/>
                 <a:cs typeface="Times New Roman" panose="02020603050405020304" pitchFamily="18" charset="0"/>
               </a:rPr>
               <a:t>Days on Customer Clock: This is a calculated field (arrival date – release date or system date if no release date is present). It represents how long the customer has been in control of a piece of equipment since that equipment was last in someone else’s control.</a:t>
             </a:r>
           </a:p>
           <a:p>
-            <a:pPr marL="342900" marR="0" lvl="0" indent="-342900">
+            <a:pPr marL="342900" indent="-342900">
               <a:lnSpc>
-                <a:spcPct val="107000"/>
+                <a:spcPct val="100000"/>
               </a:lnSpc>
               <a:spcBef>
                 <a:spcPts val="0"/>
               </a:spcBef>
               <a:spcAft>
-                <a:spcPts val="800"/>
+                <a:spcPts val="0"/>
               </a:spcAft>
               <a:buFont typeface="+mj-lt"/>
               <a:buAutoNum type="arabicPeriod"/>
             </a:pPr>
+            <a:r>
+              <a:rPr lang="en-US" sz="1800" dirty="0">
+                <a:latin typeface="Calibri" panose="020F0502020204030204" pitchFamily="34" charset="0"/>
+                <a:cs typeface="Times New Roman" panose="02020603050405020304" pitchFamily="18" charset="0"/>
+              </a:rPr>
+              <a:t>Days at Location: This is a calculated field (arrival date – system date if no release date is present). In this subset of data this will </a:t>
+            </a:r>
             <a:r>
               <a:rPr lang="en-US" sz="1800" dirty="0">
                 <a:effectLst/>
@@ -5456,10 +5943,20 @@
                 <a:ea typeface="Calibri" panose="020F0502020204030204" pitchFamily="34" charset="0"/>
                 <a:cs typeface="Times New Roman" panose="02020603050405020304" pitchFamily="18" charset="0"/>
               </a:rPr>
-              <a:t>Days at Location: This is a calculated field (arrival date – system date if no release date is present). In this subset of data this will usually match Days on Customer Clock however if a piece of equipment has been released by the customer but not yet picked up by us, this value will be higher than Days on Customer Clock. A measure of how long a piece of equipment has stayed at the last event’s location.</a:t>
-            </a:r>
-          </a:p>
-          <a:p>
+              <a:t>usually match Days on Customer Clock however if a piece of equipment has been released by the customer but not yet picked up by us, this value will be higher than Days on Customer Clock. A measure of how long a piece of equipment has stayed at the last event’s location.</a:t>
+            </a:r>
+          </a:p>
+          <a:p>
+            <a:pPr marL="342900" indent="-342900">
+              <a:spcBef>
+                <a:spcPts val="0"/>
+              </a:spcBef>
+              <a:spcAft>
+                <a:spcPts val="0"/>
+              </a:spcAft>
+              <a:buFont typeface="+mj-lt"/>
+              <a:buAutoNum type="arabicPeriod"/>
+            </a:pPr>
             <a:r>
               <a:rPr lang="en-US" sz="1800" dirty="0">
                 <a:effectLst/>
@@ -5555,7 +6052,7 @@
         </p:blipFill>
         <p:spPr>
           <a:xfrm>
-            <a:off x="4310062" y="2372519"/>
+            <a:off x="4340225" y="2228850"/>
             <a:ext cx="3571875" cy="3257550"/>
           </a:xfrm>
           <a:prstGeom prst="rect">
@@ -5645,7 +6142,7 @@
         </p:blipFill>
         <p:spPr>
           <a:xfrm>
-            <a:off x="4310062" y="2758281"/>
+            <a:off x="4340225" y="2614613"/>
             <a:ext cx="3571875" cy="2486025"/>
           </a:xfrm>
           <a:prstGeom prst="rect">
@@ -5735,7 +6232,7 @@
         </p:blipFill>
         <p:spPr>
           <a:xfrm>
-            <a:off x="4310062" y="2353469"/>
+            <a:off x="4340225" y="2209800"/>
             <a:ext cx="3571875" cy="3295650"/>
           </a:xfrm>
           <a:prstGeom prst="rect">
@@ -5825,7 +6322,7 @@
         </p:blipFill>
         <p:spPr>
           <a:xfrm>
-            <a:off x="4310062" y="2743994"/>
+            <a:off x="4340225" y="2600325"/>
             <a:ext cx="3571875" cy="2514600"/>
           </a:xfrm>
           <a:prstGeom prst="rect">
@@ -5847,54 +6344,54 @@
 </file>
 
 <file path=ppt/theme/theme1.xml><?xml version="1.0" encoding="utf-8"?>
-<a:theme xmlns:a="http://schemas.openxmlformats.org/drawingml/2006/main" name="Office Theme">
+<a:theme xmlns:a="http://schemas.openxmlformats.org/drawingml/2006/main" name="Retrospect">
   <a:themeElements>
-    <a:clrScheme name="Office">
+    <a:clrScheme name="Retrospect">
       <a:dk1>
-        <a:sysClr val="windowText" lastClr="000000"/>
+        <a:srgbClr val="000000"/>
       </a:dk1>
       <a:lt1>
         <a:sysClr val="window" lastClr="FFFFFF"/>
       </a:lt1>
       <a:dk2>
-        <a:srgbClr val="44546A"/>
+        <a:srgbClr val="637052"/>
       </a:dk2>
       <a:lt2>
-        <a:srgbClr val="E7E6E6"/>
+        <a:srgbClr val="CCDDEA"/>
       </a:lt2>
       <a:accent1>
-        <a:srgbClr val="4472C4"/>
+        <a:srgbClr val="E48312"/>
       </a:accent1>
       <a:accent2>
-        <a:srgbClr val="ED7D31"/>
+        <a:srgbClr val="BD582C"/>
       </a:accent2>
       <a:accent3>
-        <a:srgbClr val="A5A5A5"/>
+        <a:srgbClr val="865640"/>
       </a:accent3>
       <a:accent4>
-        <a:srgbClr val="FFC000"/>
+        <a:srgbClr val="9B8357"/>
       </a:accent4>
       <a:accent5>
-        <a:srgbClr val="5B9BD5"/>
+        <a:srgbClr val="C2BC80"/>
       </a:accent5>
       <a:accent6>
-        <a:srgbClr val="70AD47"/>
+        <a:srgbClr val="94A088"/>
       </a:accent6>
       <a:hlink>
-        <a:srgbClr val="0563C1"/>
+        <a:srgbClr val="2998E3"/>
       </a:hlink>
       <a:folHlink>
-        <a:srgbClr val="954F72"/>
+        <a:srgbClr val="8C8C8C"/>
       </a:folHlink>
     </a:clrScheme>
-    <a:fontScheme name="Office">
+    <a:fontScheme name="Retrospect">
       <a:majorFont>
         <a:latin typeface="Calibri Light" panose="020F0302020204030204"/>
         <a:ea typeface=""/>
         <a:cs typeface=""/>
-        <a:font script="Jpan" typeface="游ゴシック Light"/>
+        <a:font script="Jpan" typeface="ＭＳ Ｐゴシック"/>
         <a:font script="Hang" typeface="맑은 고딕"/>
-        <a:font script="Hans" typeface="等线 Light"/>
+        <a:font script="Hans" typeface="宋体"/>
         <a:font script="Hant" typeface="新細明體"/>
         <a:font script="Arab" typeface="Times New Roman"/>
         <a:font script="Hebr" typeface="Times New Roman"/>
@@ -5922,31 +6419,14 @@
         <a:font script="Viet" typeface="Times New Roman"/>
         <a:font script="Uigh" typeface="Microsoft Uighur"/>
         <a:font script="Geor" typeface="Sylfaen"/>
-        <a:font script="Armn" typeface="Arial"/>
-        <a:font script="Bugi" typeface="Leelawadee UI"/>
-        <a:font script="Bopo" typeface="Microsoft JhengHei"/>
-        <a:font script="Java" typeface="Javanese Text"/>
-        <a:font script="Lisu" typeface="Segoe UI"/>
-        <a:font script="Mymr" typeface="Myanmar Text"/>
-        <a:font script="Nkoo" typeface="Ebrima"/>
-        <a:font script="Olck" typeface="Nirmala UI"/>
-        <a:font script="Osma" typeface="Ebrima"/>
-        <a:font script="Phag" typeface="Phagspa"/>
-        <a:font script="Syrn" typeface="Estrangelo Edessa"/>
-        <a:font script="Syrj" typeface="Estrangelo Edessa"/>
-        <a:font script="Syre" typeface="Estrangelo Edessa"/>
-        <a:font script="Sora" typeface="Nirmala UI"/>
-        <a:font script="Tale" typeface="Microsoft Tai Le"/>
-        <a:font script="Talu" typeface="Microsoft New Tai Lue"/>
-        <a:font script="Tfng" typeface="Ebrima"/>
       </a:majorFont>
       <a:minorFont>
         <a:latin typeface="Calibri" panose="020F0502020204030204"/>
         <a:ea typeface=""/>
         <a:cs typeface=""/>
-        <a:font script="Jpan" typeface="游ゴシック"/>
+        <a:font script="Jpan" typeface="ＭＳ Ｐゴシック"/>
         <a:font script="Hang" typeface="맑은 고딕"/>
-        <a:font script="Hans" typeface="等线"/>
+        <a:font script="Hans" typeface="宋体"/>
         <a:font script="Hant" typeface="新細明體"/>
         <a:font script="Arab" typeface="Arial"/>
         <a:font script="Hebr" typeface="Arial"/>
@@ -5974,26 +6454,9 @@
         <a:font script="Viet" typeface="Arial"/>
         <a:font script="Uigh" typeface="Microsoft Uighur"/>
         <a:font script="Geor" typeface="Sylfaen"/>
-        <a:font script="Armn" typeface="Arial"/>
-        <a:font script="Bugi" typeface="Leelawadee UI"/>
-        <a:font script="Bopo" typeface="Microsoft JhengHei"/>
-        <a:font script="Java" typeface="Javanese Text"/>
-        <a:font script="Lisu" typeface="Segoe UI"/>
-        <a:font script="Mymr" typeface="Myanmar Text"/>
-        <a:font script="Nkoo" typeface="Ebrima"/>
-        <a:font script="Olck" typeface="Nirmala UI"/>
-        <a:font script="Osma" typeface="Ebrima"/>
-        <a:font script="Phag" typeface="Phagspa"/>
-        <a:font script="Syrn" typeface="Estrangelo Edessa"/>
-        <a:font script="Syrj" typeface="Estrangelo Edessa"/>
-        <a:font script="Syre" typeface="Estrangelo Edessa"/>
-        <a:font script="Sora" typeface="Nirmala UI"/>
-        <a:font script="Tale" typeface="Microsoft Tai Le"/>
-        <a:font script="Talu" typeface="Microsoft New Tai Lue"/>
-        <a:font script="Tfng" typeface="Ebrima"/>
       </a:minorFont>
     </a:fontScheme>
-    <a:fmtScheme name="Office">
+    <a:fmtScheme name="Retrospect">
       <a:fillStyleLst>
         <a:solidFill>
           <a:schemeClr val="phClr"/>
@@ -6002,76 +6465,81 @@
           <a:gsLst>
             <a:gs pos="0">
               <a:schemeClr val="phClr">
-                <a:lumMod val="110000"/>
-                <a:satMod val="105000"/>
-                <a:tint val="67000"/>
+                <a:tint val="65000"/>
+                <a:shade val="92000"/>
+                <a:satMod val="130000"/>
               </a:schemeClr>
             </a:gs>
-            <a:gs pos="50000">
+            <a:gs pos="45000">
               <a:schemeClr val="phClr">
-                <a:lumMod val="105000"/>
-                <a:satMod val="103000"/>
-                <a:tint val="73000"/>
+                <a:tint val="60000"/>
+                <a:shade val="99000"/>
+                <a:satMod val="120000"/>
               </a:schemeClr>
             </a:gs>
             <a:gs pos="100000">
               <a:schemeClr val="phClr">
-                <a:lumMod val="105000"/>
-                <a:satMod val="109000"/>
-                <a:tint val="81000"/>
+                <a:tint val="55000"/>
+                <a:satMod val="140000"/>
               </a:schemeClr>
             </a:gs>
           </a:gsLst>
-          <a:lin ang="5400000" scaled="0"/>
+          <a:path path="circle">
+            <a:fillToRect l="100000" t="100000" r="100000" b="100000"/>
+          </a:path>
         </a:gradFill>
         <a:gradFill rotWithShape="1">
           <a:gsLst>
             <a:gs pos="0">
               <a:schemeClr val="phClr">
-                <a:satMod val="103000"/>
-                <a:lumMod val="102000"/>
-                <a:tint val="94000"/>
+                <a:shade val="85000"/>
+                <a:satMod val="130000"/>
               </a:schemeClr>
             </a:gs>
-            <a:gs pos="50000">
+            <a:gs pos="34000">
               <a:schemeClr val="phClr">
-                <a:satMod val="110000"/>
-                <a:lumMod val="100000"/>
-                <a:shade val="100000"/>
+                <a:shade val="87000"/>
+                <a:satMod val="125000"/>
+              </a:schemeClr>
+            </a:gs>
+            <a:gs pos="70000">
+              <a:schemeClr val="phClr">
+                <a:tint val="100000"/>
+                <a:shade val="90000"/>
+                <a:satMod val="130000"/>
               </a:schemeClr>
             </a:gs>
             <a:gs pos="100000">
               <a:schemeClr val="phClr">
-                <a:lumMod val="99000"/>
-                <a:satMod val="120000"/>
-                <a:shade val="78000"/>
+                <a:tint val="100000"/>
+                <a:shade val="100000"/>
+                <a:satMod val="110000"/>
               </a:schemeClr>
             </a:gs>
           </a:gsLst>
-          <a:lin ang="5400000" scaled="0"/>
+          <a:path path="circle">
+            <a:fillToRect l="100000" t="100000" r="100000" b="100000"/>
+          </a:path>
         </a:gradFill>
       </a:fillStyleLst>
       <a:lnStyleLst>
-        <a:ln w="6350" cap="flat" cmpd="sng" algn="ctr">
-          <a:solidFill>
-            <a:schemeClr val="phClr"/>
-          </a:solidFill>
-          <a:prstDash val="solid"/>
-          <a:miter lim="800000"/>
-        </a:ln>
         <a:ln w="12700" cap="flat" cmpd="sng" algn="ctr">
           <a:solidFill>
             <a:schemeClr val="phClr"/>
           </a:solidFill>
           <a:prstDash val="solid"/>
-          <a:miter lim="800000"/>
         </a:ln>
-        <a:ln w="19050" cap="flat" cmpd="sng" algn="ctr">
+        <a:ln w="15875" cap="flat" cmpd="sng" algn="ctr">
           <a:solidFill>
             <a:schemeClr val="phClr"/>
           </a:solidFill>
           <a:prstDash val="solid"/>
-          <a:miter lim="800000"/>
+        </a:ln>
+        <a:ln w="25400" cap="flat" cmpd="sng" algn="ctr">
+          <a:solidFill>
+            <a:schemeClr val="phClr"/>
+          </a:solidFill>
+          <a:prstDash val="solid"/>
         </a:ln>
       </a:lnStyleLst>
       <a:effectStyleLst>
@@ -6079,16 +6547,33 @@
           <a:effectLst/>
         </a:effectStyle>
         <a:effectStyle>
-          <a:effectLst/>
+          <a:effectLst>
+            <a:outerShdw blurRad="38100" dist="25400" dir="2700000" algn="br" rotWithShape="0">
+              <a:srgbClr val="000000">
+                <a:alpha val="60000"/>
+              </a:srgbClr>
+            </a:outerShdw>
+          </a:effectLst>
         </a:effectStyle>
         <a:effectStyle>
           <a:effectLst>
-            <a:outerShdw blurRad="57150" dist="19050" dir="5400000" algn="ctr" rotWithShape="0">
+            <a:outerShdw blurRad="44450" dist="25400" dir="2700000" algn="br" rotWithShape="0">
               <a:srgbClr val="000000">
-                <a:alpha val="63000"/>
+                <a:alpha val="60000"/>
               </a:srgbClr>
             </a:outerShdw>
           </a:effectLst>
+          <a:scene3d>
+            <a:camera prst="orthographicFront">
+              <a:rot lat="0" lon="0" rev="0"/>
+            </a:camera>
+            <a:lightRig rig="threePt" dir="t">
+              <a:rot lat="0" lon="0" rev="19800000"/>
+            </a:lightRig>
+          </a:scene3d>
+          <a:sp3d prstMaterial="flat">
+            <a:bevelT w="25400" h="31750"/>
+          </a:sp3d>
         </a:effectStyle>
       </a:effectStyleLst>
       <a:bgFillStyleLst>
@@ -6097,36 +6582,36 @@
         </a:solidFill>
         <a:solidFill>
           <a:schemeClr val="phClr">
-            <a:tint val="95000"/>
-            <a:satMod val="170000"/>
+            <a:tint val="90000"/>
+            <a:shade val="97000"/>
+            <a:satMod val="130000"/>
           </a:schemeClr>
         </a:solidFill>
         <a:gradFill rotWithShape="1">
           <a:gsLst>
             <a:gs pos="0">
               <a:schemeClr val="phClr">
-                <a:tint val="93000"/>
-                <a:satMod val="150000"/>
-                <a:shade val="98000"/>
-                <a:lumMod val="102000"/>
+                <a:tint val="96000"/>
+                <a:shade val="99000"/>
+                <a:satMod val="140000"/>
               </a:schemeClr>
             </a:gs>
-            <a:gs pos="50000">
+            <a:gs pos="65000">
               <a:schemeClr val="phClr">
-                <a:tint val="98000"/>
+                <a:tint val="100000"/>
+                <a:shade val="80000"/>
                 <a:satMod val="130000"/>
-                <a:shade val="90000"/>
-                <a:lumMod val="103000"/>
               </a:schemeClr>
             </a:gs>
             <a:gs pos="100000">
               <a:schemeClr val="phClr">
-                <a:shade val="63000"/>
+                <a:tint val="100000"/>
+                <a:shade val="48000"/>
                 <a:satMod val="120000"/>
               </a:schemeClr>
             </a:gs>
           </a:gsLst>
-          <a:lin ang="5400000" scaled="0"/>
+          <a:lin ang="16200000" scaled="0"/>
         </a:gradFill>
       </a:bgFillStyleLst>
     </a:fmtScheme>
@@ -6135,7 +6620,7 @@
   <a:extraClrSchemeLst/>
   <a:extLst>
     <a:ext uri="{05A4C25C-085E-4340-85A3-A5531E510DB2}">
-      <thm15:themeFamily xmlns:thm15="http://schemas.microsoft.com/office/thememl/2012/main" name="Office Theme" id="{62F939B6-93AF-4DB8-9C6B-D6C7DFDC589F}" vid="{4A3C46E8-61CC-4603-A589-7422A47A8E4A}"/>
+      <thm15:themeFamily xmlns:thm15="http://schemas.microsoft.com/office/thememl/2012/main" name="Retrospect" id="{5F128B03-DCCA-4EEB-AB3B-CF2899314A46}" vid="{3F1AAB62-24C6-49D2-8E01-B56FAC9A3DCD}"/>
     </a:ext>
   </a:extLst>
 </a:theme>

</xml_diff>